<commit_message>
fix error when server exits
</commit_message>
<xml_diff>
--- a/Messenger project - automative team.pptx
+++ b/Messenger project - automative team.pptx
@@ -185,138 +185,6 @@
     </pc:docChg>
   </pc:docChgLst>
   <pc:docChgLst>
-    <pc:chgData name="Hoang Viet Do" userId="e2eb6b5bc1244b19" providerId="Windows Live" clId="Web-{B11DBECE-C9A6-4984-82BC-7530EC095172}"/>
-    <pc:docChg chg="modSld sldOrd">
-      <pc:chgData name="Hoang Viet Do" userId="e2eb6b5bc1244b19" providerId="Windows Live" clId="Web-{B11DBECE-C9A6-4984-82BC-7530EC095172}" dt="2022-07-07T07:47:34.775" v="102" actId="20577"/>
-      <pc:docMkLst>
-        <pc:docMk/>
-      </pc:docMkLst>
-      <pc:sldChg chg="modSp">
-        <pc:chgData name="Hoang Viet Do" userId="e2eb6b5bc1244b19" providerId="Windows Live" clId="Web-{B11DBECE-C9A6-4984-82BC-7530EC095172}" dt="2022-07-07T07:45:10.176" v="51" actId="20577"/>
-        <pc:sldMkLst>
-          <pc:docMk/>
-          <pc:sldMk cId="0" sldId="256"/>
-        </pc:sldMkLst>
-        <pc:spChg chg="mod">
-          <ac:chgData name="Hoang Viet Do" userId="e2eb6b5bc1244b19" providerId="Windows Live" clId="Web-{B11DBECE-C9A6-4984-82BC-7530EC095172}" dt="2022-07-07T07:45:10.176" v="51" actId="20577"/>
-          <ac:spMkLst>
-            <pc:docMk/>
-            <pc:sldMk cId="0" sldId="256"/>
-            <ac:spMk id="51" creationId="{00000000-0000-0000-0000-000000000000}"/>
-          </ac:spMkLst>
-        </pc:spChg>
-      </pc:sldChg>
-      <pc:sldChg chg="modSp">
-        <pc:chgData name="Hoang Viet Do" userId="e2eb6b5bc1244b19" providerId="Windows Live" clId="Web-{B11DBECE-C9A6-4984-82BC-7530EC095172}" dt="2022-07-07T07:41:30.137" v="12" actId="20577"/>
-        <pc:sldMkLst>
-          <pc:docMk/>
-          <pc:sldMk cId="1387878423" sldId="441"/>
-        </pc:sldMkLst>
-        <pc:spChg chg="mod">
-          <ac:chgData name="Hoang Viet Do" userId="e2eb6b5bc1244b19" providerId="Windows Live" clId="Web-{B11DBECE-C9A6-4984-82BC-7530EC095172}" dt="2022-07-07T07:41:30.137" v="12" actId="20577"/>
-          <ac:spMkLst>
-            <pc:docMk/>
-            <pc:sldMk cId="1387878423" sldId="441"/>
-            <ac:spMk id="5" creationId="{7BF29E1B-B140-8049-B0E0-84F692751D27}"/>
-          </ac:spMkLst>
-        </pc:spChg>
-      </pc:sldChg>
-      <pc:sldChg chg="modSp">
-        <pc:chgData name="Hoang Viet Do" userId="e2eb6b5bc1244b19" providerId="Windows Live" clId="Web-{B11DBECE-C9A6-4984-82BC-7530EC095172}" dt="2022-07-07T07:47:34.775" v="102" actId="20577"/>
-        <pc:sldMkLst>
-          <pc:docMk/>
-          <pc:sldMk cId="3495838407" sldId="442"/>
-        </pc:sldMkLst>
-        <pc:spChg chg="mod">
-          <ac:chgData name="Hoang Viet Do" userId="e2eb6b5bc1244b19" providerId="Windows Live" clId="Web-{B11DBECE-C9A6-4984-82BC-7530EC095172}" dt="2022-07-07T07:46:10.022" v="72" actId="20577"/>
-          <ac:spMkLst>
-            <pc:docMk/>
-            <pc:sldMk cId="3495838407" sldId="442"/>
-            <ac:spMk id="2" creationId="{05D7CCE5-225A-F746-A275-2224521CDBDA}"/>
-          </ac:spMkLst>
-        </pc:spChg>
-        <pc:spChg chg="mod">
-          <ac:chgData name="Hoang Viet Do" userId="e2eb6b5bc1244b19" providerId="Windows Live" clId="Web-{B11DBECE-C9A6-4984-82BC-7530EC095172}" dt="2022-07-07T07:47:34.775" v="102" actId="20577"/>
-          <ac:spMkLst>
-            <pc:docMk/>
-            <pc:sldMk cId="3495838407" sldId="442"/>
-            <ac:spMk id="3" creationId="{9D769FD7-F52E-E54F-86E8-B53BAE9BFF38}"/>
-          </ac:spMkLst>
-        </pc:spChg>
-      </pc:sldChg>
-      <pc:sldChg chg="ord">
-        <pc:chgData name="Hoang Viet Do" userId="e2eb6b5bc1244b19" providerId="Windows Live" clId="Web-{B11DBECE-C9A6-4984-82BC-7530EC095172}" dt="2022-07-07T07:43:45.673" v="48"/>
-        <pc:sldMkLst>
-          <pc:docMk/>
-          <pc:sldMk cId="3062071461" sldId="444"/>
-        </pc:sldMkLst>
-      </pc:sldChg>
-      <pc:sldChg chg="addSp delSp modSp mod setBg">
-        <pc:chgData name="Hoang Viet Do" userId="e2eb6b5bc1244b19" providerId="Windows Live" clId="Web-{B11DBECE-C9A6-4984-82BC-7530EC095172}" dt="2022-07-07T07:42:28.639" v="27" actId="20577"/>
-        <pc:sldMkLst>
-          <pc:docMk/>
-          <pc:sldMk cId="2482696332" sldId="470"/>
-        </pc:sldMkLst>
-        <pc:spChg chg="mod ord">
-          <ac:chgData name="Hoang Viet Do" userId="e2eb6b5bc1244b19" providerId="Windows Live" clId="Web-{B11DBECE-C9A6-4984-82BC-7530EC095172}" dt="2022-07-07T07:41:04.448" v="9"/>
-          <ac:spMkLst>
-            <pc:docMk/>
-            <pc:sldMk cId="2482696332" sldId="470"/>
-            <ac:spMk id="2" creationId="{00000000-0000-0000-0000-000000000000}"/>
-          </ac:spMkLst>
-        </pc:spChg>
-        <pc:spChg chg="add mod">
-          <ac:chgData name="Hoang Viet Do" userId="e2eb6b5bc1244b19" providerId="Windows Live" clId="Web-{B11DBECE-C9A6-4984-82BC-7530EC095172}" dt="2022-07-07T07:41:04.448" v="9"/>
-          <ac:spMkLst>
-            <pc:docMk/>
-            <pc:sldMk cId="2482696332" sldId="470"/>
-            <ac:spMk id="4" creationId="{E6C0B6BE-77B0-FFA1-6C13-663F8B5C6AF0}"/>
-          </ac:spMkLst>
-        </pc:spChg>
-        <pc:spChg chg="mod">
-          <ac:chgData name="Hoang Viet Do" userId="e2eb6b5bc1244b19" providerId="Windows Live" clId="Web-{B11DBECE-C9A6-4984-82BC-7530EC095172}" dt="2022-07-07T07:42:28.639" v="27" actId="20577"/>
-          <ac:spMkLst>
-            <pc:docMk/>
-            <pc:sldMk cId="2482696332" sldId="470"/>
-            <ac:spMk id="5" creationId="{00000000-0000-0000-0000-000000000000}"/>
-          </ac:spMkLst>
-        </pc:spChg>
-        <pc:spChg chg="del">
-          <ac:chgData name="Hoang Viet Do" userId="e2eb6b5bc1244b19" providerId="Windows Live" clId="Web-{B11DBECE-C9A6-4984-82BC-7530EC095172}" dt="2022-07-07T07:40:29.212" v="2"/>
-          <ac:spMkLst>
-            <pc:docMk/>
-            <pc:sldMk cId="2482696332" sldId="470"/>
-            <ac:spMk id="6" creationId="{00000000-0000-0000-0000-000000000000}"/>
-          </ac:spMkLst>
-        </pc:spChg>
-        <pc:spChg chg="add del">
-          <ac:chgData name="Hoang Viet Do" userId="e2eb6b5bc1244b19" providerId="Windows Live" clId="Web-{B11DBECE-C9A6-4984-82BC-7530EC095172}" dt="2022-07-07T07:41:04.448" v="9"/>
-          <ac:spMkLst>
-            <pc:docMk/>
-            <pc:sldMk cId="2482696332" sldId="470"/>
-            <ac:spMk id="12" creationId="{2B97F24A-32CE-4C1C-A50D-3016B394DCFB}"/>
-          </ac:spMkLst>
-        </pc:spChg>
-        <pc:spChg chg="add del">
-          <ac:chgData name="Hoang Viet Do" userId="e2eb6b5bc1244b19" providerId="Windows Live" clId="Web-{B11DBECE-C9A6-4984-82BC-7530EC095172}" dt="2022-07-07T07:41:04.448" v="9"/>
-          <ac:spMkLst>
-            <pc:docMk/>
-            <pc:sldMk cId="2482696332" sldId="470"/>
-            <ac:spMk id="14" creationId="{CD8B4F24-440B-49E9-B85D-733523DC064B}"/>
-          </ac:spMkLst>
-        </pc:spChg>
-        <pc:picChg chg="add mod">
-          <ac:chgData name="Hoang Viet Do" userId="e2eb6b5bc1244b19" providerId="Windows Live" clId="Web-{B11DBECE-C9A6-4984-82BC-7530EC095172}" dt="2022-07-07T07:41:04.448" v="9"/>
-          <ac:picMkLst>
-            <pc:docMk/>
-            <pc:sldMk cId="2482696332" sldId="470"/>
-            <ac:picMk id="7" creationId="{9AA2D515-3516-C0C0-2D24-A217DD8FAC3F}"/>
-          </ac:picMkLst>
-        </pc:picChg>
-      </pc:sldChg>
-    </pc:docChg>
-  </pc:docChgLst>
-  <pc:docChgLst>
     <pc:chgData name="Guest User" providerId="Windows Live" clId="Web-{2D08EB92-7F7F-4EE3-9AE2-C7929D8753E0}"/>
     <pc:docChg chg="modSld">
       <pc:chgData name="Guest User" userId="" providerId="Windows Live" clId="Web-{2D08EB92-7F7F-4EE3-9AE2-C7929D8753E0}" dt="2022-07-07T07:31:13.506" v="7" actId="20577"/>
@@ -335,6 +203,364 @@
             <pc:docMk/>
             <pc:sldMk cId="0" sldId="256"/>
             <ac:spMk id="49" creationId="{F5476CBF-1F3C-FF45-8F2B-B2FD2B958663}"/>
+          </ac:spMkLst>
+        </pc:spChg>
+      </pc:sldChg>
+    </pc:docChg>
+  </pc:docChgLst>
+  <pc:docChgLst>
+    <pc:chgData name="Hoang Viet Do" userId="e2eb6b5bc1244b19" providerId="Windows Live" clId="Web-{8AAD0079-37FE-4186-9674-AE0C09905D07}"/>
+    <pc:docChg chg="modSld">
+      <pc:chgData name="Hoang Viet Do" userId="e2eb6b5bc1244b19" providerId="Windows Live" clId="Web-{8AAD0079-37FE-4186-9674-AE0C09905D07}" dt="2022-07-07T09:24:51.199" v="266" actId="1076"/>
+      <pc:docMkLst>
+        <pc:docMk/>
+      </pc:docMkLst>
+      <pc:sldChg chg="modSp">
+        <pc:chgData name="Hoang Viet Do" userId="e2eb6b5bc1244b19" providerId="Windows Live" clId="Web-{8AAD0079-37FE-4186-9674-AE0C09905D07}" dt="2022-07-07T09:15:24.041" v="99" actId="20577"/>
+        <pc:sldMkLst>
+          <pc:docMk/>
+          <pc:sldMk cId="1387878423" sldId="441"/>
+        </pc:sldMkLst>
+        <pc:spChg chg="mod">
+          <ac:chgData name="Hoang Viet Do" userId="e2eb6b5bc1244b19" providerId="Windows Live" clId="Web-{8AAD0079-37FE-4186-9674-AE0C09905D07}" dt="2022-07-07T09:15:24.041" v="99" actId="20577"/>
+          <ac:spMkLst>
+            <pc:docMk/>
+            <pc:sldMk cId="1387878423" sldId="441"/>
+            <ac:spMk id="5" creationId="{7BF29E1B-B140-8049-B0E0-84F692751D27}"/>
+          </ac:spMkLst>
+        </pc:spChg>
+      </pc:sldChg>
+      <pc:sldChg chg="modSp">
+        <pc:chgData name="Hoang Viet Do" userId="e2eb6b5bc1244b19" providerId="Windows Live" clId="Web-{8AAD0079-37FE-4186-9674-AE0C09905D07}" dt="2022-07-07T09:09:54.281" v="20" actId="20577"/>
+        <pc:sldMkLst>
+          <pc:docMk/>
+          <pc:sldMk cId="3495838407" sldId="442"/>
+        </pc:sldMkLst>
+        <pc:spChg chg="mod">
+          <ac:chgData name="Hoang Viet Do" userId="e2eb6b5bc1244b19" providerId="Windows Live" clId="Web-{8AAD0079-37FE-4186-9674-AE0C09905D07}" dt="2022-07-07T09:09:54.281" v="20" actId="20577"/>
+          <ac:spMkLst>
+            <pc:docMk/>
+            <pc:sldMk cId="3495838407" sldId="442"/>
+            <ac:spMk id="3" creationId="{9D769FD7-F52E-E54F-86E8-B53BAE9BFF38}"/>
+          </ac:spMkLst>
+        </pc:spChg>
+      </pc:sldChg>
+      <pc:sldChg chg="modSp">
+        <pc:chgData name="Hoang Viet Do" userId="e2eb6b5bc1244b19" providerId="Windows Live" clId="Web-{8AAD0079-37FE-4186-9674-AE0C09905D07}" dt="2022-07-07T09:10:01.906" v="21" actId="20577"/>
+        <pc:sldMkLst>
+          <pc:docMk/>
+          <pc:sldMk cId="3062071461" sldId="444"/>
+        </pc:sldMkLst>
+        <pc:spChg chg="mod">
+          <ac:chgData name="Hoang Viet Do" userId="e2eb6b5bc1244b19" providerId="Windows Live" clId="Web-{8AAD0079-37FE-4186-9674-AE0C09905D07}" dt="2022-07-07T09:10:01.906" v="21" actId="20577"/>
+          <ac:spMkLst>
+            <pc:docMk/>
+            <pc:sldMk cId="3062071461" sldId="444"/>
+            <ac:spMk id="15" creationId="{B50E86AD-5D2E-AE08-9414-FF32D6F0F719}"/>
+          </ac:spMkLst>
+        </pc:spChg>
+        <pc:picChg chg="mod">
+          <ac:chgData name="Hoang Viet Do" userId="e2eb6b5bc1244b19" providerId="Windows Live" clId="Web-{8AAD0079-37FE-4186-9674-AE0C09905D07}" dt="2022-07-07T09:09:08.139" v="14" actId="1076"/>
+          <ac:picMkLst>
+            <pc:docMk/>
+            <pc:sldMk cId="3062071461" sldId="444"/>
+            <ac:picMk id="19" creationId="{C72B3F81-BDE0-1889-61E0-DF87DEBAA430}"/>
+          </ac:picMkLst>
+        </pc:picChg>
+      </pc:sldChg>
+      <pc:sldChg chg="modSp">
+        <pc:chgData name="Hoang Viet Do" userId="e2eb6b5bc1244b19" providerId="Windows Live" clId="Web-{8AAD0079-37FE-4186-9674-AE0C09905D07}" dt="2022-07-07T09:16:08.496" v="110" actId="1076"/>
+        <pc:sldMkLst>
+          <pc:docMk/>
+          <pc:sldMk cId="2482696332" sldId="470"/>
+        </pc:sldMkLst>
+        <pc:spChg chg="mod">
+          <ac:chgData name="Hoang Viet Do" userId="e2eb6b5bc1244b19" providerId="Windows Live" clId="Web-{8AAD0079-37FE-4186-9674-AE0C09905D07}" dt="2022-07-07T09:16:01.261" v="108" actId="20577"/>
+          <ac:spMkLst>
+            <pc:docMk/>
+            <pc:sldMk cId="2482696332" sldId="470"/>
+            <ac:spMk id="4" creationId="{E6C0B6BE-77B0-FFA1-6C13-663F8B5C6AF0}"/>
+          </ac:spMkLst>
+        </pc:spChg>
+        <pc:picChg chg="mod">
+          <ac:chgData name="Hoang Viet Do" userId="e2eb6b5bc1244b19" providerId="Windows Live" clId="Web-{8AAD0079-37FE-4186-9674-AE0C09905D07}" dt="2022-07-07T09:16:08.496" v="110" actId="1076"/>
+          <ac:picMkLst>
+            <pc:docMk/>
+            <pc:sldMk cId="2482696332" sldId="470"/>
+            <ac:picMk id="7" creationId="{9AA2D515-3516-C0C0-2D24-A217DD8FAC3F}"/>
+          </ac:picMkLst>
+        </pc:picChg>
+      </pc:sldChg>
+      <pc:sldChg chg="modSp">
+        <pc:chgData name="Hoang Viet Do" userId="e2eb6b5bc1244b19" providerId="Windows Live" clId="Web-{8AAD0079-37FE-4186-9674-AE0C09905D07}" dt="2022-07-07T09:15:42.542" v="103"/>
+        <pc:sldMkLst>
+          <pc:docMk/>
+          <pc:sldMk cId="1189515993" sldId="479"/>
+        </pc:sldMkLst>
+        <pc:spChg chg="mod">
+          <ac:chgData name="Hoang Viet Do" userId="e2eb6b5bc1244b19" providerId="Windows Live" clId="Web-{8AAD0079-37FE-4186-9674-AE0C09905D07}" dt="2022-07-07T09:12:10.582" v="50" actId="1076"/>
+          <ac:spMkLst>
+            <pc:docMk/>
+            <pc:sldMk cId="1189515993" sldId="479"/>
+            <ac:spMk id="15" creationId="{B50E86AD-5D2E-AE08-9414-FF32D6F0F719}"/>
+          </ac:spMkLst>
+        </pc:spChg>
+        <pc:graphicFrameChg chg="mod modGraphic">
+          <ac:chgData name="Hoang Viet Do" userId="e2eb6b5bc1244b19" providerId="Windows Live" clId="Web-{8AAD0079-37FE-4186-9674-AE0C09905D07}" dt="2022-07-07T09:15:42.542" v="103"/>
+          <ac:graphicFrameMkLst>
+            <pc:docMk/>
+            <pc:sldMk cId="1189515993" sldId="479"/>
+            <ac:graphicFrameMk id="18" creationId="{F1BB12E8-F754-43E7-3E64-D9C3DCBB8350}"/>
+          </ac:graphicFrameMkLst>
+        </pc:graphicFrameChg>
+      </pc:sldChg>
+      <pc:sldChg chg="addSp modSp modTransition">
+        <pc:chgData name="Hoang Viet Do" userId="e2eb6b5bc1244b19" providerId="Windows Live" clId="Web-{8AAD0079-37FE-4186-9674-AE0C09905D07}" dt="2022-07-07T09:22:18.054" v="203"/>
+        <pc:sldMkLst>
+          <pc:docMk/>
+          <pc:sldMk cId="2099011842" sldId="480"/>
+        </pc:sldMkLst>
+        <pc:spChg chg="mod ord">
+          <ac:chgData name="Hoang Viet Do" userId="e2eb6b5bc1244b19" providerId="Windows Live" clId="Web-{8AAD0079-37FE-4186-9674-AE0C09905D07}" dt="2022-07-07T09:20:34.410" v="170" actId="1076"/>
+          <ac:spMkLst>
+            <pc:docMk/>
+            <pc:sldMk cId="2099011842" sldId="480"/>
+            <ac:spMk id="4" creationId="{E6C0B6BE-77B0-FFA1-6C13-663F8B5C6AF0}"/>
+          </ac:spMkLst>
+        </pc:spChg>
+        <pc:spChg chg="add mod">
+          <ac:chgData name="Hoang Viet Do" userId="e2eb6b5bc1244b19" providerId="Windows Live" clId="Web-{8AAD0079-37FE-4186-9674-AE0C09905D07}" dt="2022-07-07T09:21:16.161" v="186" actId="20577"/>
+          <ac:spMkLst>
+            <pc:docMk/>
+            <pc:sldMk cId="2099011842" sldId="480"/>
+            <ac:spMk id="8" creationId="{632EF7D8-E1D9-861A-2AA9-F395393FFC1D}"/>
+          </ac:spMkLst>
+        </pc:spChg>
+        <pc:spChg chg="add mod">
+          <ac:chgData name="Hoang Viet Do" userId="e2eb6b5bc1244b19" providerId="Windows Live" clId="Web-{8AAD0079-37FE-4186-9674-AE0C09905D07}" dt="2022-07-07T09:20:40.332" v="171" actId="1076"/>
+          <ac:spMkLst>
+            <pc:docMk/>
+            <pc:sldMk cId="2099011842" sldId="480"/>
+            <ac:spMk id="9" creationId="{4EB1A1B3-E6AB-0CC1-92BF-3F73C531E4BE}"/>
+          </ac:spMkLst>
+        </pc:spChg>
+        <pc:picChg chg="mod">
+          <ac:chgData name="Hoang Viet Do" userId="e2eb6b5bc1244b19" providerId="Windows Live" clId="Web-{8AAD0079-37FE-4186-9674-AE0C09905D07}" dt="2022-07-07T09:20:18.706" v="167" actId="1076"/>
+          <ac:picMkLst>
+            <pc:docMk/>
+            <pc:sldMk cId="2099011842" sldId="480"/>
+            <ac:picMk id="3" creationId="{4FC50E9A-62D5-C941-8E62-15A245230D8A}"/>
+          </ac:picMkLst>
+        </pc:picChg>
+        <pc:picChg chg="mod">
+          <ac:chgData name="Hoang Viet Do" userId="e2eb6b5bc1244b19" providerId="Windows Live" clId="Web-{8AAD0079-37FE-4186-9674-AE0C09905D07}" dt="2022-07-07T09:20:05.097" v="166" actId="1076"/>
+          <ac:picMkLst>
+            <pc:docMk/>
+            <pc:sldMk cId="2099011842" sldId="480"/>
+            <ac:picMk id="6" creationId="{CF3DE148-997C-55AE-E679-096247DB5B03}"/>
+          </ac:picMkLst>
+        </pc:picChg>
+      </pc:sldChg>
+      <pc:sldChg chg="addSp modSp">
+        <pc:chgData name="Hoang Viet Do" userId="e2eb6b5bc1244b19" providerId="Windows Live" clId="Web-{8AAD0079-37FE-4186-9674-AE0C09905D07}" dt="2022-07-07T09:22:05.819" v="201" actId="1076"/>
+        <pc:sldMkLst>
+          <pc:docMk/>
+          <pc:sldMk cId="2750268428" sldId="481"/>
+        </pc:sldMkLst>
+        <pc:spChg chg="mod">
+          <ac:chgData name="Hoang Viet Do" userId="e2eb6b5bc1244b19" providerId="Windows Live" clId="Web-{8AAD0079-37FE-4186-9674-AE0C09905D07}" dt="2022-07-07T09:21:04.942" v="183" actId="1076"/>
+          <ac:spMkLst>
+            <pc:docMk/>
+            <pc:sldMk cId="2750268428" sldId="481"/>
+            <ac:spMk id="4" creationId="{E6C0B6BE-77B0-FFA1-6C13-663F8B5C6AF0}"/>
+          </ac:spMkLst>
+        </pc:spChg>
+        <pc:spChg chg="add mod">
+          <ac:chgData name="Hoang Viet Do" userId="e2eb6b5bc1244b19" providerId="Windows Live" clId="Web-{8AAD0079-37FE-4186-9674-AE0C09905D07}" dt="2022-07-07T09:22:05.819" v="201" actId="1076"/>
+          <ac:spMkLst>
+            <pc:docMk/>
+            <pc:sldMk cId="2750268428" sldId="481"/>
+            <ac:spMk id="8" creationId="{FE704053-FE81-A7F1-4BBF-63201FE721C9}"/>
+          </ac:spMkLst>
+        </pc:spChg>
+        <pc:spChg chg="add mod">
+          <ac:chgData name="Hoang Viet Do" userId="e2eb6b5bc1244b19" providerId="Windows Live" clId="Web-{8AAD0079-37FE-4186-9674-AE0C09905D07}" dt="2022-07-07T09:21:51.694" v="199" actId="1076"/>
+          <ac:spMkLst>
+            <pc:docMk/>
+            <pc:sldMk cId="2750268428" sldId="481"/>
+            <ac:spMk id="10" creationId="{E5FDAA6B-E39E-4D8E-A34E-4FBAF22B7283}"/>
+          </ac:spMkLst>
+        </pc:spChg>
+        <pc:picChg chg="mod">
+          <ac:chgData name="Hoang Viet Do" userId="e2eb6b5bc1244b19" providerId="Windows Live" clId="Web-{8AAD0079-37FE-4186-9674-AE0C09905D07}" dt="2022-07-07T09:22:05.804" v="200" actId="1076"/>
+          <ac:picMkLst>
+            <pc:docMk/>
+            <pc:sldMk cId="2750268428" sldId="481"/>
+            <ac:picMk id="3" creationId="{7A677367-BC5F-AB6C-A4C4-DBFBABA1B347}"/>
+          </ac:picMkLst>
+        </pc:picChg>
+        <pc:picChg chg="mod">
+          <ac:chgData name="Hoang Viet Do" userId="e2eb6b5bc1244b19" providerId="Windows Live" clId="Web-{8AAD0079-37FE-4186-9674-AE0C09905D07}" dt="2022-07-07T09:21:37.287" v="194" actId="1076"/>
+          <ac:picMkLst>
+            <pc:docMk/>
+            <pc:sldMk cId="2750268428" sldId="481"/>
+            <ac:picMk id="6" creationId="{F8ADD9AF-12ED-CEB5-EE82-6BE17412CBE4}"/>
+          </ac:picMkLst>
+        </pc:picChg>
+      </pc:sldChg>
+      <pc:sldChg chg="addSp modSp">
+        <pc:chgData name="Hoang Viet Do" userId="e2eb6b5bc1244b19" providerId="Windows Live" clId="Web-{8AAD0079-37FE-4186-9674-AE0C09905D07}" dt="2022-07-07T09:23:34.400" v="234" actId="1076"/>
+        <pc:sldMkLst>
+          <pc:docMk/>
+          <pc:sldMk cId="1316453521" sldId="483"/>
+        </pc:sldMkLst>
+        <pc:spChg chg="mod">
+          <ac:chgData name="Hoang Viet Do" userId="e2eb6b5bc1244b19" providerId="Windows Live" clId="Web-{8AAD0079-37FE-4186-9674-AE0C09905D07}" dt="2022-07-07T09:23:07.524" v="225" actId="1076"/>
+          <ac:spMkLst>
+            <pc:docMk/>
+            <pc:sldMk cId="1316453521" sldId="483"/>
+            <ac:spMk id="4" creationId="{E6C0B6BE-77B0-FFA1-6C13-663F8B5C6AF0}"/>
+          </ac:spMkLst>
+        </pc:spChg>
+        <pc:spChg chg="add mod">
+          <ac:chgData name="Hoang Viet Do" userId="e2eb6b5bc1244b19" providerId="Windows Live" clId="Web-{8AAD0079-37FE-4186-9674-AE0C09905D07}" dt="2022-07-07T09:23:34.400" v="234" actId="1076"/>
+          <ac:spMkLst>
+            <pc:docMk/>
+            <pc:sldMk cId="1316453521" sldId="483"/>
+            <ac:spMk id="6" creationId="{DBF0CC03-987B-B24E-F6A0-0C159C6FBBCF}"/>
+          </ac:spMkLst>
+        </pc:spChg>
+        <pc:picChg chg="mod">
+          <ac:chgData name="Hoang Viet Do" userId="e2eb6b5bc1244b19" providerId="Windows Live" clId="Web-{8AAD0079-37FE-4186-9674-AE0C09905D07}" dt="2022-07-07T09:23:31.291" v="233" actId="1076"/>
+          <ac:picMkLst>
+            <pc:docMk/>
+            <pc:sldMk cId="1316453521" sldId="483"/>
+            <ac:picMk id="7" creationId="{AA3E387D-4E69-DAE7-BA53-02D1C15A5B94}"/>
+          </ac:picMkLst>
+        </pc:picChg>
+      </pc:sldChg>
+      <pc:sldChg chg="addSp delSp modSp">
+        <pc:chgData name="Hoang Viet Do" userId="e2eb6b5bc1244b19" providerId="Windows Live" clId="Web-{8AAD0079-37FE-4186-9674-AE0C09905D07}" dt="2022-07-07T09:24:51.199" v="266" actId="1076"/>
+        <pc:sldMkLst>
+          <pc:docMk/>
+          <pc:sldMk cId="659620441" sldId="484"/>
+        </pc:sldMkLst>
+        <pc:spChg chg="add del mod">
+          <ac:chgData name="Hoang Viet Do" userId="e2eb6b5bc1244b19" providerId="Windows Live" clId="Web-{8AAD0079-37FE-4186-9674-AE0C09905D07}" dt="2022-07-07T09:24:36.324" v="253" actId="1076"/>
+          <ac:spMkLst>
+            <pc:docMk/>
+            <pc:sldMk cId="659620441" sldId="484"/>
+            <ac:spMk id="4" creationId="{E6C0B6BE-77B0-FFA1-6C13-663F8B5C6AF0}"/>
+          </ac:spMkLst>
+        </pc:spChg>
+        <pc:spChg chg="add del">
+          <ac:chgData name="Hoang Viet Do" userId="e2eb6b5bc1244b19" providerId="Windows Live" clId="Web-{8AAD0079-37FE-4186-9674-AE0C09905D07}" dt="2022-07-07T09:24:22.527" v="245"/>
+          <ac:spMkLst>
+            <pc:docMk/>
+            <pc:sldMk cId="659620441" sldId="484"/>
+            <ac:spMk id="7" creationId="{4E26161F-27D1-6013-7E8F-BB7B0F295A2F}"/>
+          </ac:spMkLst>
+        </pc:spChg>
+        <pc:spChg chg="add mod">
+          <ac:chgData name="Hoang Viet Do" userId="e2eb6b5bc1244b19" providerId="Windows Live" clId="Web-{8AAD0079-37FE-4186-9674-AE0C09905D07}" dt="2022-07-07T09:24:51.199" v="266" actId="1076"/>
+          <ac:spMkLst>
+            <pc:docMk/>
+            <pc:sldMk cId="659620441" sldId="484"/>
+            <ac:spMk id="9" creationId="{ED7BD1C6-906C-3CD3-18E0-9220E5F65D1A}"/>
+          </ac:spMkLst>
+        </pc:spChg>
+        <pc:spChg chg="add del mod">
+          <ac:chgData name="Hoang Viet Do" userId="e2eb6b5bc1244b19" providerId="Windows Live" clId="Web-{8AAD0079-37FE-4186-9674-AE0C09905D07}" dt="2022-07-07T09:24:04.464" v="238"/>
+          <ac:spMkLst>
+            <pc:docMk/>
+            <pc:sldMk cId="659620441" sldId="484"/>
+            <ac:spMk id="11" creationId="{658EB650-238E-A663-7085-B15A37A62F06}"/>
+          </ac:spMkLst>
+        </pc:spChg>
+        <pc:spChg chg="add del mod">
+          <ac:chgData name="Hoang Viet Do" userId="e2eb6b5bc1244b19" providerId="Windows Live" clId="Web-{8AAD0079-37FE-4186-9674-AE0C09905D07}" dt="2022-07-07T09:24:17.839" v="242"/>
+          <ac:spMkLst>
+            <pc:docMk/>
+            <pc:sldMk cId="659620441" sldId="484"/>
+            <ac:spMk id="13" creationId="{D0EAB466-31F7-D6B5-25C6-8A249C3ADEE1}"/>
+          </ac:spMkLst>
+        </pc:spChg>
+      </pc:sldChg>
+    </pc:docChg>
+  </pc:docChgLst>
+  <pc:docChgLst>
+    <pc:chgData name="Viet Kynl" userId="cb75b9d50f6a58d9" providerId="LiveId" clId="{F23FDA5B-8939-4E7A-B1AB-1943FE16EF1A}"/>
+    <pc:docChg chg="modSld">
+      <pc:chgData name="Viet Kynl" userId="cb75b9d50f6a58d9" providerId="LiveId" clId="{F23FDA5B-8939-4E7A-B1AB-1943FE16EF1A}" dt="2022-07-07T15:28:40.634" v="3" actId="20577"/>
+      <pc:docMkLst>
+        <pc:docMk/>
+      </pc:docMkLst>
+      <pc:sldChg chg="modSp mod">
+        <pc:chgData name="Viet Kynl" userId="cb75b9d50f6a58d9" providerId="LiveId" clId="{F23FDA5B-8939-4E7A-B1AB-1943FE16EF1A}" dt="2022-07-07T15:28:40.634" v="3" actId="20577"/>
+        <pc:sldMkLst>
+          <pc:docMk/>
+          <pc:sldMk cId="2281471491" sldId="455"/>
+        </pc:sldMkLst>
+        <pc:spChg chg="mod">
+          <ac:chgData name="Viet Kynl" userId="cb75b9d50f6a58d9" providerId="LiveId" clId="{F23FDA5B-8939-4E7A-B1AB-1943FE16EF1A}" dt="2022-07-07T15:28:40.634" v="3" actId="20577"/>
+          <ac:spMkLst>
+            <pc:docMk/>
+            <pc:sldMk cId="2281471491" sldId="455"/>
+            <ac:spMk id="3" creationId="{00000000-0000-0000-0000-000000000000}"/>
+          </ac:spMkLst>
+        </pc:spChg>
+      </pc:sldChg>
+    </pc:docChg>
+  </pc:docChgLst>
+  <pc:docChgLst>
+    <pc:chgData name="Người dùng Khách" providerId="Windows Live" clId="Web-{197375C6-9970-4A03-9392-CB8223235834}"/>
+    <pc:docChg chg="modSld">
+      <pc:chgData name="Người dùng Khách" userId="" providerId="Windows Live" clId="Web-{197375C6-9970-4A03-9392-CB8223235834}" dt="2022-07-07T07:58:18.021" v="361" actId="20577"/>
+      <pc:docMkLst>
+        <pc:docMk/>
+      </pc:docMkLst>
+      <pc:sldChg chg="modSp">
+        <pc:chgData name="Người dùng Khách" userId="" providerId="Windows Live" clId="Web-{197375C6-9970-4A03-9392-CB8223235834}" dt="2022-07-07T07:31:36.517" v="55" actId="20577"/>
+        <pc:sldMkLst>
+          <pc:docMk/>
+          <pc:sldMk cId="0" sldId="256"/>
+        </pc:sldMkLst>
+        <pc:spChg chg="mod">
+          <ac:chgData name="Người dùng Khách" userId="" providerId="Windows Live" clId="Web-{197375C6-9970-4A03-9392-CB8223235834}" dt="2022-07-07T07:31:36.517" v="55" actId="20577"/>
+          <ac:spMkLst>
+            <pc:docMk/>
+            <pc:sldMk cId="0" sldId="256"/>
+            <ac:spMk id="51" creationId="{00000000-0000-0000-0000-000000000000}"/>
+          </ac:spMkLst>
+        </pc:spChg>
+      </pc:sldChg>
+      <pc:sldChg chg="modSp">
+        <pc:chgData name="Người dùng Khách" userId="" providerId="Windows Live" clId="Web-{197375C6-9970-4A03-9392-CB8223235834}" dt="2022-07-07T07:57:34.129" v="355" actId="20577"/>
+        <pc:sldMkLst>
+          <pc:docMk/>
+          <pc:sldMk cId="1387878423" sldId="441"/>
+        </pc:sldMkLst>
+        <pc:spChg chg="mod">
+          <ac:chgData name="Người dùng Khách" userId="" providerId="Windows Live" clId="Web-{197375C6-9970-4A03-9392-CB8223235834}" dt="2022-07-07T07:57:34.129" v="355" actId="20577"/>
+          <ac:spMkLst>
+            <pc:docMk/>
+            <pc:sldMk cId="1387878423" sldId="441"/>
+            <ac:spMk id="5" creationId="{7BF29E1B-B140-8049-B0E0-84F692751D27}"/>
+          </ac:spMkLst>
+        </pc:spChg>
+      </pc:sldChg>
+      <pc:sldChg chg="modSp">
+        <pc:chgData name="Người dùng Khách" userId="" providerId="Windows Live" clId="Web-{197375C6-9970-4A03-9392-CB8223235834}" dt="2022-07-07T07:58:18.021" v="361" actId="20577"/>
+        <pc:sldMkLst>
+          <pc:docMk/>
+          <pc:sldMk cId="3495838407" sldId="442"/>
+        </pc:sldMkLst>
+        <pc:spChg chg="mod">
+          <ac:chgData name="Người dùng Khách" userId="" providerId="Windows Live" clId="Web-{197375C6-9970-4A03-9392-CB8223235834}" dt="2022-07-07T07:58:18.021" v="361" actId="20577"/>
+          <ac:spMkLst>
+            <pc:docMk/>
+            <pc:sldMk cId="3495838407" sldId="442"/>
+            <ac:spMk id="3" creationId="{9D769FD7-F52E-E54F-86E8-B53BAE9BFF38}"/>
           </ac:spMkLst>
         </pc:spChg>
       </pc:sldChg>
@@ -824,20 +1050,20 @@
     </pc:docChg>
   </pc:docChgLst>
   <pc:docChgLst>
-    <pc:chgData name="Người dùng Khách" providerId="Windows Live" clId="Web-{197375C6-9970-4A03-9392-CB8223235834}"/>
-    <pc:docChg chg="modSld">
-      <pc:chgData name="Người dùng Khách" userId="" providerId="Windows Live" clId="Web-{197375C6-9970-4A03-9392-CB8223235834}" dt="2022-07-07T07:58:18.021" v="361" actId="20577"/>
+    <pc:chgData name="Hoang Viet Do" userId="e2eb6b5bc1244b19" providerId="Windows Live" clId="Web-{B11DBECE-C9A6-4984-82BC-7530EC095172}"/>
+    <pc:docChg chg="modSld sldOrd">
+      <pc:chgData name="Hoang Viet Do" userId="e2eb6b5bc1244b19" providerId="Windows Live" clId="Web-{B11DBECE-C9A6-4984-82BC-7530EC095172}" dt="2022-07-07T07:47:34.775" v="102" actId="20577"/>
       <pc:docMkLst>
         <pc:docMk/>
       </pc:docMkLst>
       <pc:sldChg chg="modSp">
-        <pc:chgData name="Người dùng Khách" userId="" providerId="Windows Live" clId="Web-{197375C6-9970-4A03-9392-CB8223235834}" dt="2022-07-07T07:31:36.517" v="55" actId="20577"/>
+        <pc:chgData name="Hoang Viet Do" userId="e2eb6b5bc1244b19" providerId="Windows Live" clId="Web-{B11DBECE-C9A6-4984-82BC-7530EC095172}" dt="2022-07-07T07:45:10.176" v="51" actId="20577"/>
         <pc:sldMkLst>
           <pc:docMk/>
           <pc:sldMk cId="0" sldId="256"/>
         </pc:sldMkLst>
         <pc:spChg chg="mod">
-          <ac:chgData name="Người dùng Khách" userId="" providerId="Windows Live" clId="Web-{197375C6-9970-4A03-9392-CB8223235834}" dt="2022-07-07T07:31:36.517" v="55" actId="20577"/>
+          <ac:chgData name="Hoang Viet Do" userId="e2eb6b5bc1244b19" providerId="Windows Live" clId="Web-{B11DBECE-C9A6-4984-82BC-7530EC095172}" dt="2022-07-07T07:45:10.176" v="51" actId="20577"/>
           <ac:spMkLst>
             <pc:docMk/>
             <pc:sldMk cId="0" sldId="256"/>
@@ -846,13 +1072,13 @@
         </pc:spChg>
       </pc:sldChg>
       <pc:sldChg chg="modSp">
-        <pc:chgData name="Người dùng Khách" userId="" providerId="Windows Live" clId="Web-{197375C6-9970-4A03-9392-CB8223235834}" dt="2022-07-07T07:57:34.129" v="355" actId="20577"/>
+        <pc:chgData name="Hoang Viet Do" userId="e2eb6b5bc1244b19" providerId="Windows Live" clId="Web-{B11DBECE-C9A6-4984-82BC-7530EC095172}" dt="2022-07-07T07:41:30.137" v="12" actId="20577"/>
         <pc:sldMkLst>
           <pc:docMk/>
           <pc:sldMk cId="1387878423" sldId="441"/>
         </pc:sldMkLst>
         <pc:spChg chg="mod">
-          <ac:chgData name="Người dùng Khách" userId="" providerId="Windows Live" clId="Web-{197375C6-9970-4A03-9392-CB8223235834}" dt="2022-07-07T07:57:34.129" v="355" actId="20577"/>
+          <ac:chgData name="Hoang Viet Do" userId="e2eb6b5bc1244b19" providerId="Windows Live" clId="Web-{B11DBECE-C9A6-4984-82BC-7530EC095172}" dt="2022-07-07T07:41:30.137" v="12" actId="20577"/>
           <ac:spMkLst>
             <pc:docMk/>
             <pc:sldMk cId="1387878423" sldId="441"/>
@@ -861,19 +1087,97 @@
         </pc:spChg>
       </pc:sldChg>
       <pc:sldChg chg="modSp">
-        <pc:chgData name="Người dùng Khách" userId="" providerId="Windows Live" clId="Web-{197375C6-9970-4A03-9392-CB8223235834}" dt="2022-07-07T07:58:18.021" v="361" actId="20577"/>
+        <pc:chgData name="Hoang Viet Do" userId="e2eb6b5bc1244b19" providerId="Windows Live" clId="Web-{B11DBECE-C9A6-4984-82BC-7530EC095172}" dt="2022-07-07T07:47:34.775" v="102" actId="20577"/>
         <pc:sldMkLst>
           <pc:docMk/>
           <pc:sldMk cId="3495838407" sldId="442"/>
         </pc:sldMkLst>
         <pc:spChg chg="mod">
-          <ac:chgData name="Người dùng Khách" userId="" providerId="Windows Live" clId="Web-{197375C6-9970-4A03-9392-CB8223235834}" dt="2022-07-07T07:58:18.021" v="361" actId="20577"/>
+          <ac:chgData name="Hoang Viet Do" userId="e2eb6b5bc1244b19" providerId="Windows Live" clId="Web-{B11DBECE-C9A6-4984-82BC-7530EC095172}" dt="2022-07-07T07:46:10.022" v="72" actId="20577"/>
+          <ac:spMkLst>
+            <pc:docMk/>
+            <pc:sldMk cId="3495838407" sldId="442"/>
+            <ac:spMk id="2" creationId="{05D7CCE5-225A-F746-A275-2224521CDBDA}"/>
+          </ac:spMkLst>
+        </pc:spChg>
+        <pc:spChg chg="mod">
+          <ac:chgData name="Hoang Viet Do" userId="e2eb6b5bc1244b19" providerId="Windows Live" clId="Web-{B11DBECE-C9A6-4984-82BC-7530EC095172}" dt="2022-07-07T07:47:34.775" v="102" actId="20577"/>
           <ac:spMkLst>
             <pc:docMk/>
             <pc:sldMk cId="3495838407" sldId="442"/>
             <ac:spMk id="3" creationId="{9D769FD7-F52E-E54F-86E8-B53BAE9BFF38}"/>
           </ac:spMkLst>
         </pc:spChg>
+      </pc:sldChg>
+      <pc:sldChg chg="ord">
+        <pc:chgData name="Hoang Viet Do" userId="e2eb6b5bc1244b19" providerId="Windows Live" clId="Web-{B11DBECE-C9A6-4984-82BC-7530EC095172}" dt="2022-07-07T07:43:45.673" v="48"/>
+        <pc:sldMkLst>
+          <pc:docMk/>
+          <pc:sldMk cId="3062071461" sldId="444"/>
+        </pc:sldMkLst>
+      </pc:sldChg>
+      <pc:sldChg chg="addSp delSp modSp mod setBg">
+        <pc:chgData name="Hoang Viet Do" userId="e2eb6b5bc1244b19" providerId="Windows Live" clId="Web-{B11DBECE-C9A6-4984-82BC-7530EC095172}" dt="2022-07-07T07:42:28.639" v="27" actId="20577"/>
+        <pc:sldMkLst>
+          <pc:docMk/>
+          <pc:sldMk cId="2482696332" sldId="470"/>
+        </pc:sldMkLst>
+        <pc:spChg chg="mod ord">
+          <ac:chgData name="Hoang Viet Do" userId="e2eb6b5bc1244b19" providerId="Windows Live" clId="Web-{B11DBECE-C9A6-4984-82BC-7530EC095172}" dt="2022-07-07T07:41:04.448" v="9"/>
+          <ac:spMkLst>
+            <pc:docMk/>
+            <pc:sldMk cId="2482696332" sldId="470"/>
+            <ac:spMk id="2" creationId="{00000000-0000-0000-0000-000000000000}"/>
+          </ac:spMkLst>
+        </pc:spChg>
+        <pc:spChg chg="add mod">
+          <ac:chgData name="Hoang Viet Do" userId="e2eb6b5bc1244b19" providerId="Windows Live" clId="Web-{B11DBECE-C9A6-4984-82BC-7530EC095172}" dt="2022-07-07T07:41:04.448" v="9"/>
+          <ac:spMkLst>
+            <pc:docMk/>
+            <pc:sldMk cId="2482696332" sldId="470"/>
+            <ac:spMk id="4" creationId="{E6C0B6BE-77B0-FFA1-6C13-663F8B5C6AF0}"/>
+          </ac:spMkLst>
+        </pc:spChg>
+        <pc:spChg chg="mod">
+          <ac:chgData name="Hoang Viet Do" userId="e2eb6b5bc1244b19" providerId="Windows Live" clId="Web-{B11DBECE-C9A6-4984-82BC-7530EC095172}" dt="2022-07-07T07:42:28.639" v="27" actId="20577"/>
+          <ac:spMkLst>
+            <pc:docMk/>
+            <pc:sldMk cId="2482696332" sldId="470"/>
+            <ac:spMk id="5" creationId="{00000000-0000-0000-0000-000000000000}"/>
+          </ac:spMkLst>
+        </pc:spChg>
+        <pc:spChg chg="del">
+          <ac:chgData name="Hoang Viet Do" userId="e2eb6b5bc1244b19" providerId="Windows Live" clId="Web-{B11DBECE-C9A6-4984-82BC-7530EC095172}" dt="2022-07-07T07:40:29.212" v="2"/>
+          <ac:spMkLst>
+            <pc:docMk/>
+            <pc:sldMk cId="2482696332" sldId="470"/>
+            <ac:spMk id="6" creationId="{00000000-0000-0000-0000-000000000000}"/>
+          </ac:spMkLst>
+        </pc:spChg>
+        <pc:spChg chg="add del">
+          <ac:chgData name="Hoang Viet Do" userId="e2eb6b5bc1244b19" providerId="Windows Live" clId="Web-{B11DBECE-C9A6-4984-82BC-7530EC095172}" dt="2022-07-07T07:41:04.448" v="9"/>
+          <ac:spMkLst>
+            <pc:docMk/>
+            <pc:sldMk cId="2482696332" sldId="470"/>
+            <ac:spMk id="12" creationId="{2B97F24A-32CE-4C1C-A50D-3016B394DCFB}"/>
+          </ac:spMkLst>
+        </pc:spChg>
+        <pc:spChg chg="add del">
+          <ac:chgData name="Hoang Viet Do" userId="e2eb6b5bc1244b19" providerId="Windows Live" clId="Web-{B11DBECE-C9A6-4984-82BC-7530EC095172}" dt="2022-07-07T07:41:04.448" v="9"/>
+          <ac:spMkLst>
+            <pc:docMk/>
+            <pc:sldMk cId="2482696332" sldId="470"/>
+            <ac:spMk id="14" creationId="{CD8B4F24-440B-49E9-B85D-733523DC064B}"/>
+          </ac:spMkLst>
+        </pc:spChg>
+        <pc:picChg chg="add mod">
+          <ac:chgData name="Hoang Viet Do" userId="e2eb6b5bc1244b19" providerId="Windows Live" clId="Web-{B11DBECE-C9A6-4984-82BC-7530EC095172}" dt="2022-07-07T07:41:04.448" v="9"/>
+          <ac:picMkLst>
+            <pc:docMk/>
+            <pc:sldMk cId="2482696332" sldId="470"/>
+            <ac:picMk id="7" creationId="{9AA2D515-3516-C0C0-2D24-A217DD8FAC3F}"/>
+          </ac:picMkLst>
+        </pc:picChg>
       </pc:sldChg>
     </pc:docChg>
   </pc:docChgLst>
@@ -1258,286 +1562,6 @@
             <ac:picMk id="7" creationId="{AA3E387D-4E69-DAE7-BA53-02D1C15A5B94}"/>
           </ac:picMkLst>
         </pc:picChg>
-      </pc:sldChg>
-    </pc:docChg>
-  </pc:docChgLst>
-  <pc:docChgLst>
-    <pc:chgData name="Hoang Viet Do" userId="e2eb6b5bc1244b19" providerId="Windows Live" clId="Web-{8AAD0079-37FE-4186-9674-AE0C09905D07}"/>
-    <pc:docChg chg="modSld">
-      <pc:chgData name="Hoang Viet Do" userId="e2eb6b5bc1244b19" providerId="Windows Live" clId="Web-{8AAD0079-37FE-4186-9674-AE0C09905D07}" dt="2022-07-07T09:24:51.199" v="266" actId="1076"/>
-      <pc:docMkLst>
-        <pc:docMk/>
-      </pc:docMkLst>
-      <pc:sldChg chg="modSp">
-        <pc:chgData name="Hoang Viet Do" userId="e2eb6b5bc1244b19" providerId="Windows Live" clId="Web-{8AAD0079-37FE-4186-9674-AE0C09905D07}" dt="2022-07-07T09:15:24.041" v="99" actId="20577"/>
-        <pc:sldMkLst>
-          <pc:docMk/>
-          <pc:sldMk cId="1387878423" sldId="441"/>
-        </pc:sldMkLst>
-        <pc:spChg chg="mod">
-          <ac:chgData name="Hoang Viet Do" userId="e2eb6b5bc1244b19" providerId="Windows Live" clId="Web-{8AAD0079-37FE-4186-9674-AE0C09905D07}" dt="2022-07-07T09:15:24.041" v="99" actId="20577"/>
-          <ac:spMkLst>
-            <pc:docMk/>
-            <pc:sldMk cId="1387878423" sldId="441"/>
-            <ac:spMk id="5" creationId="{7BF29E1B-B140-8049-B0E0-84F692751D27}"/>
-          </ac:spMkLst>
-        </pc:spChg>
-      </pc:sldChg>
-      <pc:sldChg chg="modSp">
-        <pc:chgData name="Hoang Viet Do" userId="e2eb6b5bc1244b19" providerId="Windows Live" clId="Web-{8AAD0079-37FE-4186-9674-AE0C09905D07}" dt="2022-07-07T09:09:54.281" v="20" actId="20577"/>
-        <pc:sldMkLst>
-          <pc:docMk/>
-          <pc:sldMk cId="3495838407" sldId="442"/>
-        </pc:sldMkLst>
-        <pc:spChg chg="mod">
-          <ac:chgData name="Hoang Viet Do" userId="e2eb6b5bc1244b19" providerId="Windows Live" clId="Web-{8AAD0079-37FE-4186-9674-AE0C09905D07}" dt="2022-07-07T09:09:54.281" v="20" actId="20577"/>
-          <ac:spMkLst>
-            <pc:docMk/>
-            <pc:sldMk cId="3495838407" sldId="442"/>
-            <ac:spMk id="3" creationId="{9D769FD7-F52E-E54F-86E8-B53BAE9BFF38}"/>
-          </ac:spMkLst>
-        </pc:spChg>
-      </pc:sldChg>
-      <pc:sldChg chg="modSp">
-        <pc:chgData name="Hoang Viet Do" userId="e2eb6b5bc1244b19" providerId="Windows Live" clId="Web-{8AAD0079-37FE-4186-9674-AE0C09905D07}" dt="2022-07-07T09:10:01.906" v="21" actId="20577"/>
-        <pc:sldMkLst>
-          <pc:docMk/>
-          <pc:sldMk cId="3062071461" sldId="444"/>
-        </pc:sldMkLst>
-        <pc:spChg chg="mod">
-          <ac:chgData name="Hoang Viet Do" userId="e2eb6b5bc1244b19" providerId="Windows Live" clId="Web-{8AAD0079-37FE-4186-9674-AE0C09905D07}" dt="2022-07-07T09:10:01.906" v="21" actId="20577"/>
-          <ac:spMkLst>
-            <pc:docMk/>
-            <pc:sldMk cId="3062071461" sldId="444"/>
-            <ac:spMk id="15" creationId="{B50E86AD-5D2E-AE08-9414-FF32D6F0F719}"/>
-          </ac:spMkLst>
-        </pc:spChg>
-        <pc:picChg chg="mod">
-          <ac:chgData name="Hoang Viet Do" userId="e2eb6b5bc1244b19" providerId="Windows Live" clId="Web-{8AAD0079-37FE-4186-9674-AE0C09905D07}" dt="2022-07-07T09:09:08.139" v="14" actId="1076"/>
-          <ac:picMkLst>
-            <pc:docMk/>
-            <pc:sldMk cId="3062071461" sldId="444"/>
-            <ac:picMk id="19" creationId="{C72B3F81-BDE0-1889-61E0-DF87DEBAA430}"/>
-          </ac:picMkLst>
-        </pc:picChg>
-      </pc:sldChg>
-      <pc:sldChg chg="modSp">
-        <pc:chgData name="Hoang Viet Do" userId="e2eb6b5bc1244b19" providerId="Windows Live" clId="Web-{8AAD0079-37FE-4186-9674-AE0C09905D07}" dt="2022-07-07T09:16:08.496" v="110" actId="1076"/>
-        <pc:sldMkLst>
-          <pc:docMk/>
-          <pc:sldMk cId="2482696332" sldId="470"/>
-        </pc:sldMkLst>
-        <pc:spChg chg="mod">
-          <ac:chgData name="Hoang Viet Do" userId="e2eb6b5bc1244b19" providerId="Windows Live" clId="Web-{8AAD0079-37FE-4186-9674-AE0C09905D07}" dt="2022-07-07T09:16:01.261" v="108" actId="20577"/>
-          <ac:spMkLst>
-            <pc:docMk/>
-            <pc:sldMk cId="2482696332" sldId="470"/>
-            <ac:spMk id="4" creationId="{E6C0B6BE-77B0-FFA1-6C13-663F8B5C6AF0}"/>
-          </ac:spMkLst>
-        </pc:spChg>
-        <pc:picChg chg="mod">
-          <ac:chgData name="Hoang Viet Do" userId="e2eb6b5bc1244b19" providerId="Windows Live" clId="Web-{8AAD0079-37FE-4186-9674-AE0C09905D07}" dt="2022-07-07T09:16:08.496" v="110" actId="1076"/>
-          <ac:picMkLst>
-            <pc:docMk/>
-            <pc:sldMk cId="2482696332" sldId="470"/>
-            <ac:picMk id="7" creationId="{9AA2D515-3516-C0C0-2D24-A217DD8FAC3F}"/>
-          </ac:picMkLst>
-        </pc:picChg>
-      </pc:sldChg>
-      <pc:sldChg chg="modSp">
-        <pc:chgData name="Hoang Viet Do" userId="e2eb6b5bc1244b19" providerId="Windows Live" clId="Web-{8AAD0079-37FE-4186-9674-AE0C09905D07}" dt="2022-07-07T09:15:42.542" v="103"/>
-        <pc:sldMkLst>
-          <pc:docMk/>
-          <pc:sldMk cId="1189515993" sldId="479"/>
-        </pc:sldMkLst>
-        <pc:spChg chg="mod">
-          <ac:chgData name="Hoang Viet Do" userId="e2eb6b5bc1244b19" providerId="Windows Live" clId="Web-{8AAD0079-37FE-4186-9674-AE0C09905D07}" dt="2022-07-07T09:12:10.582" v="50" actId="1076"/>
-          <ac:spMkLst>
-            <pc:docMk/>
-            <pc:sldMk cId="1189515993" sldId="479"/>
-            <ac:spMk id="15" creationId="{B50E86AD-5D2E-AE08-9414-FF32D6F0F719}"/>
-          </ac:spMkLst>
-        </pc:spChg>
-        <pc:graphicFrameChg chg="mod modGraphic">
-          <ac:chgData name="Hoang Viet Do" userId="e2eb6b5bc1244b19" providerId="Windows Live" clId="Web-{8AAD0079-37FE-4186-9674-AE0C09905D07}" dt="2022-07-07T09:15:42.542" v="103"/>
-          <ac:graphicFrameMkLst>
-            <pc:docMk/>
-            <pc:sldMk cId="1189515993" sldId="479"/>
-            <ac:graphicFrameMk id="18" creationId="{F1BB12E8-F754-43E7-3E64-D9C3DCBB8350}"/>
-          </ac:graphicFrameMkLst>
-        </pc:graphicFrameChg>
-      </pc:sldChg>
-      <pc:sldChg chg="addSp modSp modTransition">
-        <pc:chgData name="Hoang Viet Do" userId="e2eb6b5bc1244b19" providerId="Windows Live" clId="Web-{8AAD0079-37FE-4186-9674-AE0C09905D07}" dt="2022-07-07T09:22:18.054" v="203"/>
-        <pc:sldMkLst>
-          <pc:docMk/>
-          <pc:sldMk cId="2099011842" sldId="480"/>
-        </pc:sldMkLst>
-        <pc:spChg chg="mod ord">
-          <ac:chgData name="Hoang Viet Do" userId="e2eb6b5bc1244b19" providerId="Windows Live" clId="Web-{8AAD0079-37FE-4186-9674-AE0C09905D07}" dt="2022-07-07T09:20:34.410" v="170" actId="1076"/>
-          <ac:spMkLst>
-            <pc:docMk/>
-            <pc:sldMk cId="2099011842" sldId="480"/>
-            <ac:spMk id="4" creationId="{E6C0B6BE-77B0-FFA1-6C13-663F8B5C6AF0}"/>
-          </ac:spMkLst>
-        </pc:spChg>
-        <pc:spChg chg="add mod">
-          <ac:chgData name="Hoang Viet Do" userId="e2eb6b5bc1244b19" providerId="Windows Live" clId="Web-{8AAD0079-37FE-4186-9674-AE0C09905D07}" dt="2022-07-07T09:21:16.161" v="186" actId="20577"/>
-          <ac:spMkLst>
-            <pc:docMk/>
-            <pc:sldMk cId="2099011842" sldId="480"/>
-            <ac:spMk id="8" creationId="{632EF7D8-E1D9-861A-2AA9-F395393FFC1D}"/>
-          </ac:spMkLst>
-        </pc:spChg>
-        <pc:spChg chg="add mod">
-          <ac:chgData name="Hoang Viet Do" userId="e2eb6b5bc1244b19" providerId="Windows Live" clId="Web-{8AAD0079-37FE-4186-9674-AE0C09905D07}" dt="2022-07-07T09:20:40.332" v="171" actId="1076"/>
-          <ac:spMkLst>
-            <pc:docMk/>
-            <pc:sldMk cId="2099011842" sldId="480"/>
-            <ac:spMk id="9" creationId="{4EB1A1B3-E6AB-0CC1-92BF-3F73C531E4BE}"/>
-          </ac:spMkLst>
-        </pc:spChg>
-        <pc:picChg chg="mod">
-          <ac:chgData name="Hoang Viet Do" userId="e2eb6b5bc1244b19" providerId="Windows Live" clId="Web-{8AAD0079-37FE-4186-9674-AE0C09905D07}" dt="2022-07-07T09:20:18.706" v="167" actId="1076"/>
-          <ac:picMkLst>
-            <pc:docMk/>
-            <pc:sldMk cId="2099011842" sldId="480"/>
-            <ac:picMk id="3" creationId="{4FC50E9A-62D5-C941-8E62-15A245230D8A}"/>
-          </ac:picMkLst>
-        </pc:picChg>
-        <pc:picChg chg="mod">
-          <ac:chgData name="Hoang Viet Do" userId="e2eb6b5bc1244b19" providerId="Windows Live" clId="Web-{8AAD0079-37FE-4186-9674-AE0C09905D07}" dt="2022-07-07T09:20:05.097" v="166" actId="1076"/>
-          <ac:picMkLst>
-            <pc:docMk/>
-            <pc:sldMk cId="2099011842" sldId="480"/>
-            <ac:picMk id="6" creationId="{CF3DE148-997C-55AE-E679-096247DB5B03}"/>
-          </ac:picMkLst>
-        </pc:picChg>
-      </pc:sldChg>
-      <pc:sldChg chg="addSp modSp">
-        <pc:chgData name="Hoang Viet Do" userId="e2eb6b5bc1244b19" providerId="Windows Live" clId="Web-{8AAD0079-37FE-4186-9674-AE0C09905D07}" dt="2022-07-07T09:22:05.819" v="201" actId="1076"/>
-        <pc:sldMkLst>
-          <pc:docMk/>
-          <pc:sldMk cId="2750268428" sldId="481"/>
-        </pc:sldMkLst>
-        <pc:spChg chg="mod">
-          <ac:chgData name="Hoang Viet Do" userId="e2eb6b5bc1244b19" providerId="Windows Live" clId="Web-{8AAD0079-37FE-4186-9674-AE0C09905D07}" dt="2022-07-07T09:21:04.942" v="183" actId="1076"/>
-          <ac:spMkLst>
-            <pc:docMk/>
-            <pc:sldMk cId="2750268428" sldId="481"/>
-            <ac:spMk id="4" creationId="{E6C0B6BE-77B0-FFA1-6C13-663F8B5C6AF0}"/>
-          </ac:spMkLst>
-        </pc:spChg>
-        <pc:spChg chg="add mod">
-          <ac:chgData name="Hoang Viet Do" userId="e2eb6b5bc1244b19" providerId="Windows Live" clId="Web-{8AAD0079-37FE-4186-9674-AE0C09905D07}" dt="2022-07-07T09:22:05.819" v="201" actId="1076"/>
-          <ac:spMkLst>
-            <pc:docMk/>
-            <pc:sldMk cId="2750268428" sldId="481"/>
-            <ac:spMk id="8" creationId="{FE704053-FE81-A7F1-4BBF-63201FE721C9}"/>
-          </ac:spMkLst>
-        </pc:spChg>
-        <pc:spChg chg="add mod">
-          <ac:chgData name="Hoang Viet Do" userId="e2eb6b5bc1244b19" providerId="Windows Live" clId="Web-{8AAD0079-37FE-4186-9674-AE0C09905D07}" dt="2022-07-07T09:21:51.694" v="199" actId="1076"/>
-          <ac:spMkLst>
-            <pc:docMk/>
-            <pc:sldMk cId="2750268428" sldId="481"/>
-            <ac:spMk id="10" creationId="{E5FDAA6B-E39E-4D8E-A34E-4FBAF22B7283}"/>
-          </ac:spMkLst>
-        </pc:spChg>
-        <pc:picChg chg="mod">
-          <ac:chgData name="Hoang Viet Do" userId="e2eb6b5bc1244b19" providerId="Windows Live" clId="Web-{8AAD0079-37FE-4186-9674-AE0C09905D07}" dt="2022-07-07T09:22:05.804" v="200" actId="1076"/>
-          <ac:picMkLst>
-            <pc:docMk/>
-            <pc:sldMk cId="2750268428" sldId="481"/>
-            <ac:picMk id="3" creationId="{7A677367-BC5F-AB6C-A4C4-DBFBABA1B347}"/>
-          </ac:picMkLst>
-        </pc:picChg>
-        <pc:picChg chg="mod">
-          <ac:chgData name="Hoang Viet Do" userId="e2eb6b5bc1244b19" providerId="Windows Live" clId="Web-{8AAD0079-37FE-4186-9674-AE0C09905D07}" dt="2022-07-07T09:21:37.287" v="194" actId="1076"/>
-          <ac:picMkLst>
-            <pc:docMk/>
-            <pc:sldMk cId="2750268428" sldId="481"/>
-            <ac:picMk id="6" creationId="{F8ADD9AF-12ED-CEB5-EE82-6BE17412CBE4}"/>
-          </ac:picMkLst>
-        </pc:picChg>
-      </pc:sldChg>
-      <pc:sldChg chg="addSp modSp">
-        <pc:chgData name="Hoang Viet Do" userId="e2eb6b5bc1244b19" providerId="Windows Live" clId="Web-{8AAD0079-37FE-4186-9674-AE0C09905D07}" dt="2022-07-07T09:23:34.400" v="234" actId="1076"/>
-        <pc:sldMkLst>
-          <pc:docMk/>
-          <pc:sldMk cId="1316453521" sldId="483"/>
-        </pc:sldMkLst>
-        <pc:spChg chg="mod">
-          <ac:chgData name="Hoang Viet Do" userId="e2eb6b5bc1244b19" providerId="Windows Live" clId="Web-{8AAD0079-37FE-4186-9674-AE0C09905D07}" dt="2022-07-07T09:23:07.524" v="225" actId="1076"/>
-          <ac:spMkLst>
-            <pc:docMk/>
-            <pc:sldMk cId="1316453521" sldId="483"/>
-            <ac:spMk id="4" creationId="{E6C0B6BE-77B0-FFA1-6C13-663F8B5C6AF0}"/>
-          </ac:spMkLst>
-        </pc:spChg>
-        <pc:spChg chg="add mod">
-          <ac:chgData name="Hoang Viet Do" userId="e2eb6b5bc1244b19" providerId="Windows Live" clId="Web-{8AAD0079-37FE-4186-9674-AE0C09905D07}" dt="2022-07-07T09:23:34.400" v="234" actId="1076"/>
-          <ac:spMkLst>
-            <pc:docMk/>
-            <pc:sldMk cId="1316453521" sldId="483"/>
-            <ac:spMk id="6" creationId="{DBF0CC03-987B-B24E-F6A0-0C159C6FBBCF}"/>
-          </ac:spMkLst>
-        </pc:spChg>
-        <pc:picChg chg="mod">
-          <ac:chgData name="Hoang Viet Do" userId="e2eb6b5bc1244b19" providerId="Windows Live" clId="Web-{8AAD0079-37FE-4186-9674-AE0C09905D07}" dt="2022-07-07T09:23:31.291" v="233" actId="1076"/>
-          <ac:picMkLst>
-            <pc:docMk/>
-            <pc:sldMk cId="1316453521" sldId="483"/>
-            <ac:picMk id="7" creationId="{AA3E387D-4E69-DAE7-BA53-02D1C15A5B94}"/>
-          </ac:picMkLst>
-        </pc:picChg>
-      </pc:sldChg>
-      <pc:sldChg chg="addSp delSp modSp">
-        <pc:chgData name="Hoang Viet Do" userId="e2eb6b5bc1244b19" providerId="Windows Live" clId="Web-{8AAD0079-37FE-4186-9674-AE0C09905D07}" dt="2022-07-07T09:24:51.199" v="266" actId="1076"/>
-        <pc:sldMkLst>
-          <pc:docMk/>
-          <pc:sldMk cId="659620441" sldId="484"/>
-        </pc:sldMkLst>
-        <pc:spChg chg="add del mod">
-          <ac:chgData name="Hoang Viet Do" userId="e2eb6b5bc1244b19" providerId="Windows Live" clId="Web-{8AAD0079-37FE-4186-9674-AE0C09905D07}" dt="2022-07-07T09:24:36.324" v="253" actId="1076"/>
-          <ac:spMkLst>
-            <pc:docMk/>
-            <pc:sldMk cId="659620441" sldId="484"/>
-            <ac:spMk id="4" creationId="{E6C0B6BE-77B0-FFA1-6C13-663F8B5C6AF0}"/>
-          </ac:spMkLst>
-        </pc:spChg>
-        <pc:spChg chg="add del">
-          <ac:chgData name="Hoang Viet Do" userId="e2eb6b5bc1244b19" providerId="Windows Live" clId="Web-{8AAD0079-37FE-4186-9674-AE0C09905D07}" dt="2022-07-07T09:24:22.527" v="245"/>
-          <ac:spMkLst>
-            <pc:docMk/>
-            <pc:sldMk cId="659620441" sldId="484"/>
-            <ac:spMk id="7" creationId="{4E26161F-27D1-6013-7E8F-BB7B0F295A2F}"/>
-          </ac:spMkLst>
-        </pc:spChg>
-        <pc:spChg chg="add mod">
-          <ac:chgData name="Hoang Viet Do" userId="e2eb6b5bc1244b19" providerId="Windows Live" clId="Web-{8AAD0079-37FE-4186-9674-AE0C09905D07}" dt="2022-07-07T09:24:51.199" v="266" actId="1076"/>
-          <ac:spMkLst>
-            <pc:docMk/>
-            <pc:sldMk cId="659620441" sldId="484"/>
-            <ac:spMk id="9" creationId="{ED7BD1C6-906C-3CD3-18E0-9220E5F65D1A}"/>
-          </ac:spMkLst>
-        </pc:spChg>
-        <pc:spChg chg="add del mod">
-          <ac:chgData name="Hoang Viet Do" userId="e2eb6b5bc1244b19" providerId="Windows Live" clId="Web-{8AAD0079-37FE-4186-9674-AE0C09905D07}" dt="2022-07-07T09:24:04.464" v="238"/>
-          <ac:spMkLst>
-            <pc:docMk/>
-            <pc:sldMk cId="659620441" sldId="484"/>
-            <ac:spMk id="11" creationId="{658EB650-238E-A663-7085-B15A37A62F06}"/>
-          </ac:spMkLst>
-        </pc:spChg>
-        <pc:spChg chg="add del mod">
-          <ac:chgData name="Hoang Viet Do" userId="e2eb6b5bc1244b19" providerId="Windows Live" clId="Web-{8AAD0079-37FE-4186-9674-AE0C09905D07}" dt="2022-07-07T09:24:17.839" v="242"/>
-          <ac:spMkLst>
-            <pc:docMk/>
-            <pc:sldMk cId="659620441" sldId="484"/>
-            <ac:spMk id="13" creationId="{D0EAB466-31F7-D6B5-25C6-8A249C3ADEE1}"/>
-          </ac:spMkLst>
-        </pc:spChg>
       </pc:sldChg>
     </pc:docChg>
   </pc:docChgLst>
@@ -2680,13 +2704,6 @@
         </dgm:presLayoutVars>
       </dgm:prSet>
       <dgm:spPr/>
-      <dgm:t>
-        <a:bodyPr/>
-        <a:lstStyle/>
-        <a:p>
-          <a:endParaRPr lang="en-US"/>
-        </a:p>
-      </dgm:t>
     </dgm:pt>
     <dgm:pt modelId="{9F1567E5-485E-4A7C-9527-A808172DA252}" type="pres">
       <dgm:prSet presAssocID="{AEDA8741-A1FF-4BA9-8A74-44881737C40F}" presName="hierRoot1" presStyleCnt="0"/>
@@ -2707,13 +2724,6 @@
         </dgm:presLayoutVars>
       </dgm:prSet>
       <dgm:spPr/>
-      <dgm:t>
-        <a:bodyPr/>
-        <a:lstStyle/>
-        <a:p>
-          <a:endParaRPr lang="en-US"/>
-        </a:p>
-      </dgm:t>
     </dgm:pt>
     <dgm:pt modelId="{AB8ACB41-31D7-4D0A-92AC-C0BD3F4E5DB2}" type="pres">
       <dgm:prSet presAssocID="{AEDA8741-A1FF-4BA9-8A74-44881737C40F}" presName="hierChild2" presStyleCnt="0"/>
@@ -2722,13 +2732,6 @@
     <dgm:pt modelId="{E16501A9-1066-4173-9C33-FEC3E7D7F7EC}" type="pres">
       <dgm:prSet presAssocID="{80D0C430-7ECB-4453-9CA2-6A24EF0A4572}" presName="Name10" presStyleLbl="parChTrans1D2" presStyleIdx="0" presStyleCnt="3"/>
       <dgm:spPr/>
-      <dgm:t>
-        <a:bodyPr/>
-        <a:lstStyle/>
-        <a:p>
-          <a:endParaRPr lang="en-US"/>
-        </a:p>
-      </dgm:t>
     </dgm:pt>
     <dgm:pt modelId="{35DF6D9B-92A1-4DAE-8697-EFDEEFB0DC9C}" type="pres">
       <dgm:prSet presAssocID="{B755AAB0-326D-4A62-B1A2-A8D0A9FBDEA4}" presName="hierRoot2" presStyleCnt="0"/>
@@ -2749,13 +2752,6 @@
         </dgm:presLayoutVars>
       </dgm:prSet>
       <dgm:spPr/>
-      <dgm:t>
-        <a:bodyPr/>
-        <a:lstStyle/>
-        <a:p>
-          <a:endParaRPr lang="en-US"/>
-        </a:p>
-      </dgm:t>
     </dgm:pt>
     <dgm:pt modelId="{C172875B-EF8E-4655-88E0-573F21CFBC36}" type="pres">
       <dgm:prSet presAssocID="{B755AAB0-326D-4A62-B1A2-A8D0A9FBDEA4}" presName="hierChild3" presStyleCnt="0"/>
@@ -2764,13 +2760,6 @@
     <dgm:pt modelId="{B4E4F4C3-77BA-4633-8385-882C66D307D9}" type="pres">
       <dgm:prSet presAssocID="{D4E4D245-BA19-46F9-96FB-2B5F1F73865F}" presName="Name17" presStyleLbl="parChTrans1D3" presStyleIdx="0" presStyleCnt="5"/>
       <dgm:spPr/>
-      <dgm:t>
-        <a:bodyPr/>
-        <a:lstStyle/>
-        <a:p>
-          <a:endParaRPr lang="en-US"/>
-        </a:p>
-      </dgm:t>
     </dgm:pt>
     <dgm:pt modelId="{247B9892-FE31-4648-8F8A-B26DF5AC5C95}" type="pres">
       <dgm:prSet presAssocID="{D69E2586-937D-4F38-AA68-31B6EE21474B}" presName="hierRoot3" presStyleCnt="0"/>
@@ -2791,13 +2780,6 @@
         </dgm:presLayoutVars>
       </dgm:prSet>
       <dgm:spPr/>
-      <dgm:t>
-        <a:bodyPr/>
-        <a:lstStyle/>
-        <a:p>
-          <a:endParaRPr lang="en-US"/>
-        </a:p>
-      </dgm:t>
     </dgm:pt>
     <dgm:pt modelId="{3A0FD89D-1F95-4583-B432-94695B6B2F5E}" type="pres">
       <dgm:prSet presAssocID="{D69E2586-937D-4F38-AA68-31B6EE21474B}" presName="hierChild4" presStyleCnt="0"/>
@@ -2806,13 +2788,6 @@
     <dgm:pt modelId="{0DCEA53A-0395-4C2E-9B16-ED4F5BD7F511}" type="pres">
       <dgm:prSet presAssocID="{D4D96D0D-1735-4DD3-8E87-4AB510D84453}" presName="Name17" presStyleLbl="parChTrans1D3" presStyleIdx="1" presStyleCnt="5"/>
       <dgm:spPr/>
-      <dgm:t>
-        <a:bodyPr/>
-        <a:lstStyle/>
-        <a:p>
-          <a:endParaRPr lang="en-US"/>
-        </a:p>
-      </dgm:t>
     </dgm:pt>
     <dgm:pt modelId="{E8EAB885-0EC7-44E8-9677-3DA5E4921E37}" type="pres">
       <dgm:prSet presAssocID="{BF3F0978-0C24-4DEB-919F-08A5CE3812A4}" presName="hierRoot3" presStyleCnt="0"/>
@@ -2833,13 +2808,6 @@
         </dgm:presLayoutVars>
       </dgm:prSet>
       <dgm:spPr/>
-      <dgm:t>
-        <a:bodyPr/>
-        <a:lstStyle/>
-        <a:p>
-          <a:endParaRPr lang="en-US"/>
-        </a:p>
-      </dgm:t>
     </dgm:pt>
     <dgm:pt modelId="{D8B811A8-A7BF-485A-9930-F49CF7160000}" type="pres">
       <dgm:prSet presAssocID="{BF3F0978-0C24-4DEB-919F-08A5CE3812A4}" presName="hierChild4" presStyleCnt="0"/>
@@ -2848,13 +2816,6 @@
     <dgm:pt modelId="{0E47E20B-A369-4B36-8B7B-211F6844597F}" type="pres">
       <dgm:prSet presAssocID="{F2146FCE-7F09-4BB2-AC81-30F771CD03A8}" presName="Name10" presStyleLbl="parChTrans1D2" presStyleIdx="1" presStyleCnt="3"/>
       <dgm:spPr/>
-      <dgm:t>
-        <a:bodyPr/>
-        <a:lstStyle/>
-        <a:p>
-          <a:endParaRPr lang="en-US"/>
-        </a:p>
-      </dgm:t>
     </dgm:pt>
     <dgm:pt modelId="{E93DEB90-8B57-46E5-8C22-9EB43614684A}" type="pres">
       <dgm:prSet presAssocID="{2903BCEC-27A8-4CB2-9C77-588736719134}" presName="hierRoot2" presStyleCnt="0"/>
@@ -2875,13 +2836,6 @@
         </dgm:presLayoutVars>
       </dgm:prSet>
       <dgm:spPr/>
-      <dgm:t>
-        <a:bodyPr/>
-        <a:lstStyle/>
-        <a:p>
-          <a:endParaRPr lang="en-US"/>
-        </a:p>
-      </dgm:t>
     </dgm:pt>
     <dgm:pt modelId="{AA6BB5FF-30FE-46E5-BAF1-1E89F413952F}" type="pres">
       <dgm:prSet presAssocID="{2903BCEC-27A8-4CB2-9C77-588736719134}" presName="hierChild3" presStyleCnt="0"/>
@@ -2890,13 +2844,6 @@
     <dgm:pt modelId="{C073D824-849F-4630-A2BA-69809BCFF3A7}" type="pres">
       <dgm:prSet presAssocID="{C7243AE6-8C26-46F4-B7D4-DA6EFD1E470B}" presName="Name17" presStyleLbl="parChTrans1D3" presStyleIdx="2" presStyleCnt="5"/>
       <dgm:spPr/>
-      <dgm:t>
-        <a:bodyPr/>
-        <a:lstStyle/>
-        <a:p>
-          <a:endParaRPr lang="en-US"/>
-        </a:p>
-      </dgm:t>
     </dgm:pt>
     <dgm:pt modelId="{37EBA3D8-47DA-4C05-9C38-A662FA0D02C3}" type="pres">
       <dgm:prSet presAssocID="{BD08A75D-CC05-4462-BA47-73F86449BC52}" presName="hierRoot3" presStyleCnt="0"/>
@@ -2917,13 +2864,6 @@
         </dgm:presLayoutVars>
       </dgm:prSet>
       <dgm:spPr/>
-      <dgm:t>
-        <a:bodyPr/>
-        <a:lstStyle/>
-        <a:p>
-          <a:endParaRPr lang="en-US"/>
-        </a:p>
-      </dgm:t>
     </dgm:pt>
     <dgm:pt modelId="{D4C8989E-CA56-41D9-B01D-FC0EDF85AC5A}" type="pres">
       <dgm:prSet presAssocID="{BD08A75D-CC05-4462-BA47-73F86449BC52}" presName="hierChild4" presStyleCnt="0"/>
@@ -2932,13 +2872,6 @@
     <dgm:pt modelId="{48927F4D-D7C1-4077-BBBA-7101E3E8785D}" type="pres">
       <dgm:prSet presAssocID="{FBC95E5A-CF8A-4CD4-BDF7-097A2C3CB28C}" presName="Name17" presStyleLbl="parChTrans1D3" presStyleIdx="3" presStyleCnt="5"/>
       <dgm:spPr/>
-      <dgm:t>
-        <a:bodyPr/>
-        <a:lstStyle/>
-        <a:p>
-          <a:endParaRPr lang="en-US"/>
-        </a:p>
-      </dgm:t>
     </dgm:pt>
     <dgm:pt modelId="{5A573075-4C90-4D9E-B701-6C269B33DB6B}" type="pres">
       <dgm:prSet presAssocID="{2014E24D-D13B-42B6-8EC1-93A570FFEE96}" presName="hierRoot3" presStyleCnt="0"/>
@@ -2959,13 +2892,6 @@
         </dgm:presLayoutVars>
       </dgm:prSet>
       <dgm:spPr/>
-      <dgm:t>
-        <a:bodyPr/>
-        <a:lstStyle/>
-        <a:p>
-          <a:endParaRPr lang="en-US"/>
-        </a:p>
-      </dgm:t>
     </dgm:pt>
     <dgm:pt modelId="{54F84993-654E-49BC-9E21-5A46E307F93A}" type="pres">
       <dgm:prSet presAssocID="{2014E24D-D13B-42B6-8EC1-93A570FFEE96}" presName="hierChild4" presStyleCnt="0"/>
@@ -2974,13 +2900,6 @@
     <dgm:pt modelId="{F4C34634-2062-4F7E-96CA-59AF07A9C287}" type="pres">
       <dgm:prSet presAssocID="{5EE42CA2-4F2B-4DDC-A1E8-4733E25EAD48}" presName="Name17" presStyleLbl="parChTrans1D3" presStyleIdx="4" presStyleCnt="5"/>
       <dgm:spPr/>
-      <dgm:t>
-        <a:bodyPr/>
-        <a:lstStyle/>
-        <a:p>
-          <a:endParaRPr lang="en-US"/>
-        </a:p>
-      </dgm:t>
     </dgm:pt>
     <dgm:pt modelId="{2D2C6934-1925-4B95-8B02-ABA288E9AE39}" type="pres">
       <dgm:prSet presAssocID="{340F2348-3772-46F9-94D6-B0FFCD749248}" presName="hierRoot3" presStyleCnt="0"/>
@@ -3001,13 +2920,6 @@
         </dgm:presLayoutVars>
       </dgm:prSet>
       <dgm:spPr/>
-      <dgm:t>
-        <a:bodyPr/>
-        <a:lstStyle/>
-        <a:p>
-          <a:endParaRPr lang="en-US"/>
-        </a:p>
-      </dgm:t>
     </dgm:pt>
     <dgm:pt modelId="{4262EC7E-2748-4F8D-BD05-9DA06DE01C35}" type="pres">
       <dgm:prSet presAssocID="{340F2348-3772-46F9-94D6-B0FFCD749248}" presName="hierChild4" presStyleCnt="0"/>
@@ -3016,13 +2928,6 @@
     <dgm:pt modelId="{22227079-1CAD-4EB1-9552-0F43BA210E86}" type="pres">
       <dgm:prSet presAssocID="{44C184F1-BAA9-47BE-A7A8-E223E33C019F}" presName="Name10" presStyleLbl="parChTrans1D2" presStyleIdx="2" presStyleCnt="3"/>
       <dgm:spPr/>
-      <dgm:t>
-        <a:bodyPr/>
-        <a:lstStyle/>
-        <a:p>
-          <a:endParaRPr lang="en-US"/>
-        </a:p>
-      </dgm:t>
     </dgm:pt>
     <dgm:pt modelId="{99BE0F55-568A-4EAC-B2B8-61A79C25FE65}" type="pres">
       <dgm:prSet presAssocID="{6DF11C2F-FA33-45DE-A6A5-704DA596031B}" presName="hierRoot2" presStyleCnt="0"/>
@@ -3043,13 +2948,6 @@
         </dgm:presLayoutVars>
       </dgm:prSet>
       <dgm:spPr/>
-      <dgm:t>
-        <a:bodyPr/>
-        <a:lstStyle/>
-        <a:p>
-          <a:endParaRPr lang="en-US"/>
-        </a:p>
-      </dgm:t>
     </dgm:pt>
     <dgm:pt modelId="{FBBE3A94-C4F3-4952-A7EC-106169FB6E94}" type="pres">
       <dgm:prSet presAssocID="{6DF11C2F-FA33-45DE-A6A5-704DA596031B}" presName="hierChild3" presStyleCnt="0"/>
@@ -3057,33 +2955,33 @@
     </dgm:pt>
   </dgm:ptLst>
   <dgm:cxnLst>
+    <dgm:cxn modelId="{69FBAF18-62B0-471C-9FA0-6267805B59B3}" srcId="{AEDA8741-A1FF-4BA9-8A74-44881737C40F}" destId="{2903BCEC-27A8-4CB2-9C77-588736719134}" srcOrd="1" destOrd="0" parTransId="{F2146FCE-7F09-4BB2-AC81-30F771CD03A8}" sibTransId="{EAB8072E-5AF6-4315-981F-8AE7FDBA67A8}"/>
+    <dgm:cxn modelId="{F54CF723-040B-4836-9D04-A07D34E9A740}" type="presOf" srcId="{5EE42CA2-4F2B-4DDC-A1E8-4733E25EAD48}" destId="{F4C34634-2062-4F7E-96CA-59AF07A9C287}" srcOrd="0" destOrd="0" presId="urn:microsoft.com/office/officeart/2005/8/layout/hierarchy1"/>
+    <dgm:cxn modelId="{B4A8F923-F596-4601-AE9D-8EED79376804}" type="presOf" srcId="{B755AAB0-326D-4A62-B1A2-A8D0A9FBDEA4}" destId="{EBA82A49-F011-46FB-A18B-66E7910925AB}" srcOrd="0" destOrd="0" presId="urn:microsoft.com/office/officeart/2005/8/layout/hierarchy1"/>
+    <dgm:cxn modelId="{FF90273D-8EC0-4271-8214-DBF2A8D893CC}" type="presOf" srcId="{44C184F1-BAA9-47BE-A7A8-E223E33C019F}" destId="{22227079-1CAD-4EB1-9552-0F43BA210E86}" srcOrd="0" destOrd="0" presId="urn:microsoft.com/office/officeart/2005/8/layout/hierarchy1"/>
+    <dgm:cxn modelId="{3516065E-702D-4DFC-94A6-84788475543D}" srcId="{AEDA8741-A1FF-4BA9-8A74-44881737C40F}" destId="{6DF11C2F-FA33-45DE-A6A5-704DA596031B}" srcOrd="2" destOrd="0" parTransId="{44C184F1-BAA9-47BE-A7A8-E223E33C019F}" sibTransId="{33D1EC0F-B5A1-48FB-84D1-EC4F396F2115}"/>
+    <dgm:cxn modelId="{D87F4D48-E788-4D86-98EC-CB34D5403381}" srcId="{2903BCEC-27A8-4CB2-9C77-588736719134}" destId="{340F2348-3772-46F9-94D6-B0FFCD749248}" srcOrd="2" destOrd="0" parTransId="{5EE42CA2-4F2B-4DDC-A1E8-4733E25EAD48}" sibTransId="{20B1547E-A982-4A2B-96D3-CAF563B43D81}"/>
     <dgm:cxn modelId="{B482AB4C-BC68-4A28-B6A6-24DAB4BBB692}" srcId="{DDDC9315-6B50-4C02-B4D8-B30006FBDBD1}" destId="{AEDA8741-A1FF-4BA9-8A74-44881737C40F}" srcOrd="0" destOrd="0" parTransId="{5D3AE09B-2FF9-42C3-99E2-5F864B815CFF}" sibTransId="{505DD8A3-E364-4EB5-B67D-3C289D9197CF}"/>
+    <dgm:cxn modelId="{48195A4D-2278-4967-9B3B-D1F5A0EFA5EE}" type="presOf" srcId="{D4E4D245-BA19-46F9-96FB-2B5F1F73865F}" destId="{B4E4F4C3-77BA-4633-8385-882C66D307D9}" srcOrd="0" destOrd="0" presId="urn:microsoft.com/office/officeart/2005/8/layout/hierarchy1"/>
+    <dgm:cxn modelId="{2894254E-50CD-41B0-9534-0A3DC8C5A3CA}" srcId="{B755AAB0-326D-4A62-B1A2-A8D0A9FBDEA4}" destId="{BF3F0978-0C24-4DEB-919F-08A5CE3812A4}" srcOrd="1" destOrd="0" parTransId="{D4D96D0D-1735-4DD3-8E87-4AB510D84453}" sibTransId="{76DCB305-C170-43CC-A143-B50E2213277D}"/>
+    <dgm:cxn modelId="{370CFC71-0421-4519-8718-716FF279709A}" type="presOf" srcId="{BD08A75D-CC05-4462-BA47-73F86449BC52}" destId="{055F496B-A9B3-4E1B-830F-5C23D921A0AB}" srcOrd="0" destOrd="0" presId="urn:microsoft.com/office/officeart/2005/8/layout/hierarchy1"/>
     <dgm:cxn modelId="{72AD8274-921A-444B-8584-B9265CF80987}" srcId="{2903BCEC-27A8-4CB2-9C77-588736719134}" destId="{2014E24D-D13B-42B6-8EC1-93A570FFEE96}" srcOrd="1" destOrd="0" parTransId="{FBC95E5A-CF8A-4CD4-BDF7-097A2C3CB28C}" sibTransId="{2CDB6135-D4CF-4C18-BD73-DBEF3268619F}"/>
-    <dgm:cxn modelId="{69FBAF18-62B0-471C-9FA0-6267805B59B3}" srcId="{AEDA8741-A1FF-4BA9-8A74-44881737C40F}" destId="{2903BCEC-27A8-4CB2-9C77-588736719134}" srcOrd="1" destOrd="0" parTransId="{F2146FCE-7F09-4BB2-AC81-30F771CD03A8}" sibTransId="{EAB8072E-5AF6-4315-981F-8AE7FDBA67A8}"/>
-    <dgm:cxn modelId="{0C3D57FD-034B-4AA2-B852-9D3F55475899}" type="presOf" srcId="{2014E24D-D13B-42B6-8EC1-93A570FFEE96}" destId="{A6D706A8-A747-4377-AEAC-8F6BB26C6EAE}" srcOrd="0" destOrd="0" presId="urn:microsoft.com/office/officeart/2005/8/layout/hierarchy1"/>
-    <dgm:cxn modelId="{B3398BF5-5FF9-4F14-989B-303A686B88FD}" type="presOf" srcId="{D69E2586-937D-4F38-AA68-31B6EE21474B}" destId="{3172B711-5497-405A-9CE5-CEDD2DB0A47F}" srcOrd="0" destOrd="0" presId="urn:microsoft.com/office/officeart/2005/8/layout/hierarchy1"/>
-    <dgm:cxn modelId="{E518E6DD-3AD1-453F-8BCA-567FE5040A0C}" type="presOf" srcId="{DDDC9315-6B50-4C02-B4D8-B30006FBDBD1}" destId="{B0E8DA85-1DF2-464B-BC05-938065628925}" srcOrd="0" destOrd="0" presId="urn:microsoft.com/office/officeart/2005/8/layout/hierarchy1"/>
+    <dgm:cxn modelId="{6EAB2279-2954-49B7-B52B-A54DFA1E1918}" type="presOf" srcId="{6DF11C2F-FA33-45DE-A6A5-704DA596031B}" destId="{08BBAFDC-2D3B-4713-BD59-AA05BE653C99}" srcOrd="0" destOrd="0" presId="urn:microsoft.com/office/officeart/2005/8/layout/hierarchy1"/>
+    <dgm:cxn modelId="{46B3077F-8495-4952-9446-B82AD196AA85}" srcId="{AEDA8741-A1FF-4BA9-8A74-44881737C40F}" destId="{B755AAB0-326D-4A62-B1A2-A8D0A9FBDEA4}" srcOrd="0" destOrd="0" parTransId="{80D0C430-7ECB-4453-9CA2-6A24EF0A4572}" sibTransId="{0415E7EE-39E7-45C9-9C24-95099968DC02}"/>
+    <dgm:cxn modelId="{7315787F-D737-4631-8649-0DF383A70746}" type="presOf" srcId="{AEDA8741-A1FF-4BA9-8A74-44881737C40F}" destId="{3FEAF90B-6F50-4E20-8F3B-A58A1D8A6628}" srcOrd="0" destOrd="0" presId="urn:microsoft.com/office/officeart/2005/8/layout/hierarchy1"/>
+    <dgm:cxn modelId="{FF66F27F-E40D-4114-A1CB-4F8B939B5ED8}" type="presOf" srcId="{2903BCEC-27A8-4CB2-9C77-588736719134}" destId="{31EE8833-0A89-4E7C-AEA8-36B9265767A4}" srcOrd="0" destOrd="0" presId="urn:microsoft.com/office/officeart/2005/8/layout/hierarchy1"/>
     <dgm:cxn modelId="{8265CA92-B062-45E5-B875-8EBC2FF3C6DE}" srcId="{2903BCEC-27A8-4CB2-9C77-588736719134}" destId="{BD08A75D-CC05-4462-BA47-73F86449BC52}" srcOrd="0" destOrd="0" parTransId="{C7243AE6-8C26-46F4-B7D4-DA6EFD1E470B}" sibTransId="{A9E49151-3601-44D7-9AB0-089CC52A35B9}"/>
     <dgm:cxn modelId="{CC045999-D3B9-4867-B6D6-CD89BCD2FF4D}" srcId="{B755AAB0-326D-4A62-B1A2-A8D0A9FBDEA4}" destId="{D69E2586-937D-4F38-AA68-31B6EE21474B}" srcOrd="0" destOrd="0" parTransId="{D4E4D245-BA19-46F9-96FB-2B5F1F73865F}" sibTransId="{963483ED-3D00-459E-929B-3E32E49BC0EB}"/>
-    <dgm:cxn modelId="{370CFC71-0421-4519-8718-716FF279709A}" type="presOf" srcId="{BD08A75D-CC05-4462-BA47-73F86449BC52}" destId="{055F496B-A9B3-4E1B-830F-5C23D921A0AB}" srcOrd="0" destOrd="0" presId="urn:microsoft.com/office/officeart/2005/8/layout/hierarchy1"/>
+    <dgm:cxn modelId="{0A0BC0BD-F01F-4E43-8055-207A5DA2A71B}" type="presOf" srcId="{80D0C430-7ECB-4453-9CA2-6A24EF0A4572}" destId="{E16501A9-1066-4173-9C33-FEC3E7D7F7EC}" srcOrd="0" destOrd="0" presId="urn:microsoft.com/office/officeart/2005/8/layout/hierarchy1"/>
+    <dgm:cxn modelId="{195465D5-911C-457A-88F6-2868528E405F}" type="presOf" srcId="{F2146FCE-7F09-4BB2-AC81-30F771CD03A8}" destId="{0E47E20B-A369-4B36-8B7B-211F6844597F}" srcOrd="0" destOrd="0" presId="urn:microsoft.com/office/officeart/2005/8/layout/hierarchy1"/>
+    <dgm:cxn modelId="{E518E6DD-3AD1-453F-8BCA-567FE5040A0C}" type="presOf" srcId="{DDDC9315-6B50-4C02-B4D8-B30006FBDBD1}" destId="{B0E8DA85-1DF2-464B-BC05-938065628925}" srcOrd="0" destOrd="0" presId="urn:microsoft.com/office/officeart/2005/8/layout/hierarchy1"/>
     <dgm:cxn modelId="{F8F6BCE1-1059-4434-B2D4-86A8C88819D4}" type="presOf" srcId="{BF3F0978-0C24-4DEB-919F-08A5CE3812A4}" destId="{F98368B8-CF40-4525-8A00-1A38F0237370}" srcOrd="0" destOrd="0" presId="urn:microsoft.com/office/officeart/2005/8/layout/hierarchy1"/>
-    <dgm:cxn modelId="{D87F4D48-E788-4D86-98EC-CB34D5403381}" srcId="{2903BCEC-27A8-4CB2-9C77-588736719134}" destId="{340F2348-3772-46F9-94D6-B0FFCD749248}" srcOrd="2" destOrd="0" parTransId="{5EE42CA2-4F2B-4DDC-A1E8-4733E25EAD48}" sibTransId="{20B1547E-A982-4A2B-96D3-CAF563B43D81}"/>
+    <dgm:cxn modelId="{A802BEEB-58AC-44DC-A06C-9FB9EB954532}" type="presOf" srcId="{C7243AE6-8C26-46F4-B7D4-DA6EFD1E470B}" destId="{C073D824-849F-4630-A2BA-69809BCFF3A7}" srcOrd="0" destOrd="0" presId="urn:microsoft.com/office/officeart/2005/8/layout/hierarchy1"/>
+    <dgm:cxn modelId="{79B064F0-DF82-4C6E-A2E3-74EA458027D4}" type="presOf" srcId="{340F2348-3772-46F9-94D6-B0FFCD749248}" destId="{0B5FC988-3E44-4C1F-AE62-53514DF84BB4}" srcOrd="0" destOrd="0" presId="urn:microsoft.com/office/officeart/2005/8/layout/hierarchy1"/>
+    <dgm:cxn modelId="{B3398BF5-5FF9-4F14-989B-303A686B88FD}" type="presOf" srcId="{D69E2586-937D-4F38-AA68-31B6EE21474B}" destId="{3172B711-5497-405A-9CE5-CEDD2DB0A47F}" srcOrd="0" destOrd="0" presId="urn:microsoft.com/office/officeart/2005/8/layout/hierarchy1"/>
     <dgm:cxn modelId="{AB42D8FC-D06D-43AA-8CF8-F6EB9E62129A}" type="presOf" srcId="{D4D96D0D-1735-4DD3-8E87-4AB510D84453}" destId="{0DCEA53A-0395-4C2E-9B16-ED4F5BD7F511}" srcOrd="0" destOrd="0" presId="urn:microsoft.com/office/officeart/2005/8/layout/hierarchy1"/>
-    <dgm:cxn modelId="{0A0BC0BD-F01F-4E43-8055-207A5DA2A71B}" type="presOf" srcId="{80D0C430-7ECB-4453-9CA2-6A24EF0A4572}" destId="{E16501A9-1066-4173-9C33-FEC3E7D7F7EC}" srcOrd="0" destOrd="0" presId="urn:microsoft.com/office/officeart/2005/8/layout/hierarchy1"/>
-    <dgm:cxn modelId="{FF66F27F-E40D-4114-A1CB-4F8B939B5ED8}" type="presOf" srcId="{2903BCEC-27A8-4CB2-9C77-588736719134}" destId="{31EE8833-0A89-4E7C-AEA8-36B9265767A4}" srcOrd="0" destOrd="0" presId="urn:microsoft.com/office/officeart/2005/8/layout/hierarchy1"/>
-    <dgm:cxn modelId="{2894254E-50CD-41B0-9534-0A3DC8C5A3CA}" srcId="{B755AAB0-326D-4A62-B1A2-A8D0A9FBDEA4}" destId="{BF3F0978-0C24-4DEB-919F-08A5CE3812A4}" srcOrd="1" destOrd="0" parTransId="{D4D96D0D-1735-4DD3-8E87-4AB510D84453}" sibTransId="{76DCB305-C170-43CC-A143-B50E2213277D}"/>
-    <dgm:cxn modelId="{46B3077F-8495-4952-9446-B82AD196AA85}" srcId="{AEDA8741-A1FF-4BA9-8A74-44881737C40F}" destId="{B755AAB0-326D-4A62-B1A2-A8D0A9FBDEA4}" srcOrd="0" destOrd="0" parTransId="{80D0C430-7ECB-4453-9CA2-6A24EF0A4572}" sibTransId="{0415E7EE-39E7-45C9-9C24-95099968DC02}"/>
-    <dgm:cxn modelId="{3516065E-702D-4DFC-94A6-84788475543D}" srcId="{AEDA8741-A1FF-4BA9-8A74-44881737C40F}" destId="{6DF11C2F-FA33-45DE-A6A5-704DA596031B}" srcOrd="2" destOrd="0" parTransId="{44C184F1-BAA9-47BE-A7A8-E223E33C019F}" sibTransId="{33D1EC0F-B5A1-48FB-84D1-EC4F396F2115}"/>
-    <dgm:cxn modelId="{FF90273D-8EC0-4271-8214-DBF2A8D893CC}" type="presOf" srcId="{44C184F1-BAA9-47BE-A7A8-E223E33C019F}" destId="{22227079-1CAD-4EB1-9552-0F43BA210E86}" srcOrd="0" destOrd="0" presId="urn:microsoft.com/office/officeart/2005/8/layout/hierarchy1"/>
-    <dgm:cxn modelId="{B4A8F923-F596-4601-AE9D-8EED79376804}" type="presOf" srcId="{B755AAB0-326D-4A62-B1A2-A8D0A9FBDEA4}" destId="{EBA82A49-F011-46FB-A18B-66E7910925AB}" srcOrd="0" destOrd="0" presId="urn:microsoft.com/office/officeart/2005/8/layout/hierarchy1"/>
-    <dgm:cxn modelId="{195465D5-911C-457A-88F6-2868528E405F}" type="presOf" srcId="{F2146FCE-7F09-4BB2-AC81-30F771CD03A8}" destId="{0E47E20B-A369-4B36-8B7B-211F6844597F}" srcOrd="0" destOrd="0" presId="urn:microsoft.com/office/officeart/2005/8/layout/hierarchy1"/>
-    <dgm:cxn modelId="{79B064F0-DF82-4C6E-A2E3-74EA458027D4}" type="presOf" srcId="{340F2348-3772-46F9-94D6-B0FFCD749248}" destId="{0B5FC988-3E44-4C1F-AE62-53514DF84BB4}" srcOrd="0" destOrd="0" presId="urn:microsoft.com/office/officeart/2005/8/layout/hierarchy1"/>
-    <dgm:cxn modelId="{7315787F-D737-4631-8649-0DF383A70746}" type="presOf" srcId="{AEDA8741-A1FF-4BA9-8A74-44881737C40F}" destId="{3FEAF90B-6F50-4E20-8F3B-A58A1D8A6628}" srcOrd="0" destOrd="0" presId="urn:microsoft.com/office/officeart/2005/8/layout/hierarchy1"/>
-    <dgm:cxn modelId="{48195A4D-2278-4967-9B3B-D1F5A0EFA5EE}" type="presOf" srcId="{D4E4D245-BA19-46F9-96FB-2B5F1F73865F}" destId="{B4E4F4C3-77BA-4633-8385-882C66D307D9}" srcOrd="0" destOrd="0" presId="urn:microsoft.com/office/officeart/2005/8/layout/hierarchy1"/>
-    <dgm:cxn modelId="{6EAB2279-2954-49B7-B52B-A54DFA1E1918}" type="presOf" srcId="{6DF11C2F-FA33-45DE-A6A5-704DA596031B}" destId="{08BBAFDC-2D3B-4713-BD59-AA05BE653C99}" srcOrd="0" destOrd="0" presId="urn:microsoft.com/office/officeart/2005/8/layout/hierarchy1"/>
-    <dgm:cxn modelId="{A802BEEB-58AC-44DC-A06C-9FB9EB954532}" type="presOf" srcId="{C7243AE6-8C26-46F4-B7D4-DA6EFD1E470B}" destId="{C073D824-849F-4630-A2BA-69809BCFF3A7}" srcOrd="0" destOrd="0" presId="urn:microsoft.com/office/officeart/2005/8/layout/hierarchy1"/>
+    <dgm:cxn modelId="{0C3D57FD-034B-4AA2-B852-9D3F55475899}" type="presOf" srcId="{2014E24D-D13B-42B6-8EC1-93A570FFEE96}" destId="{A6D706A8-A747-4377-AEAC-8F6BB26C6EAE}" srcOrd="0" destOrd="0" presId="urn:microsoft.com/office/officeart/2005/8/layout/hierarchy1"/>
     <dgm:cxn modelId="{07D086FF-4316-45EB-B81E-43781D36C6BD}" type="presOf" srcId="{FBC95E5A-CF8A-4CD4-BDF7-097A2C3CB28C}" destId="{48927F4D-D7C1-4077-BBBA-7101E3E8785D}" srcOrd="0" destOrd="0" presId="urn:microsoft.com/office/officeart/2005/8/layout/hierarchy1"/>
-    <dgm:cxn modelId="{F54CF723-040B-4836-9D04-A07D34E9A740}" type="presOf" srcId="{5EE42CA2-4F2B-4DDC-A1E8-4733E25EAD48}" destId="{F4C34634-2062-4F7E-96CA-59AF07A9C287}" srcOrd="0" destOrd="0" presId="urn:microsoft.com/office/officeart/2005/8/layout/hierarchy1"/>
     <dgm:cxn modelId="{F2860973-0650-4324-8E3E-E2251C135C98}" type="presParOf" srcId="{B0E8DA85-1DF2-464B-BC05-938065628925}" destId="{9F1567E5-485E-4A7C-9527-A808172DA252}" srcOrd="0" destOrd="0" presId="urn:microsoft.com/office/officeart/2005/8/layout/hierarchy1"/>
     <dgm:cxn modelId="{9E4E5DFB-8EBB-4718-A39F-6D4AB2FABC06}" type="presParOf" srcId="{9F1567E5-485E-4A7C-9527-A808172DA252}" destId="{2FC1D25E-E4FB-4FD8-9CE5-4F6D268EC085}" srcOrd="0" destOrd="0" presId="urn:microsoft.com/office/officeart/2005/8/layout/hierarchy1"/>
     <dgm:cxn modelId="{E584AAA8-6D96-4C09-B98A-25500DAEFD9E}" type="presParOf" srcId="{2FC1D25E-E4FB-4FD8-9CE5-4F6D268EC085}" destId="{25F60329-C78D-4151-A4FA-D429410130D7}" srcOrd="0" destOrd="0" presId="urn:microsoft.com/office/officeart/2005/8/layout/hierarchy1"/>
@@ -3756,7 +3654,7 @@
         </a:bodyPr>
         <a:lstStyle/>
         <a:p>
-          <a:pPr lvl="0" algn="ctr" defTabSz="1244600">
+          <a:pPr marL="0" lvl="0" indent="0" algn="ctr" defTabSz="1244600">
             <a:lnSpc>
               <a:spcPct val="90000"/>
             </a:lnSpc>
@@ -3766,6 +3664,7 @@
             <a:spcAft>
               <a:spcPct val="35000"/>
             </a:spcAft>
+            <a:buNone/>
           </a:pPr>
           <a:r>
             <a:rPr lang="vi-VN" sz="2800" kern="1200">
@@ -3893,7 +3792,7 @@
         </a:bodyPr>
         <a:lstStyle/>
         <a:p>
-          <a:pPr lvl="0" algn="ctr" defTabSz="1244600" rtl="0">
+          <a:pPr marL="0" lvl="0" indent="0" algn="ctr" defTabSz="1244600" rtl="0">
             <a:lnSpc>
               <a:spcPct val="90000"/>
             </a:lnSpc>
@@ -3903,6 +3802,7 @@
             <a:spcAft>
               <a:spcPct val="35000"/>
             </a:spcAft>
+            <a:buNone/>
           </a:pPr>
           <a:r>
             <a:rPr lang="vi-VN" sz="2800" kern="1200" err="1">
@@ -4042,7 +3942,7 @@
         </a:bodyPr>
         <a:lstStyle/>
         <a:p>
-          <a:pPr lvl="0" algn="ctr" defTabSz="1244600">
+          <a:pPr marL="0" lvl="0" indent="0" algn="ctr" defTabSz="1244600">
             <a:lnSpc>
               <a:spcPct val="90000"/>
             </a:lnSpc>
@@ -4052,6 +3952,7 @@
             <a:spcAft>
               <a:spcPct val="35000"/>
             </a:spcAft>
+            <a:buNone/>
           </a:pPr>
           <a:r>
             <a:rPr lang="vi-VN" sz="2800" kern="1200">
@@ -4179,7 +4080,7 @@
         </a:bodyPr>
         <a:lstStyle/>
         <a:p>
-          <a:pPr lvl="0" algn="ctr" defTabSz="1244600">
+          <a:pPr marL="0" lvl="0" indent="0" algn="ctr" defTabSz="1244600">
             <a:lnSpc>
               <a:spcPct val="90000"/>
             </a:lnSpc>
@@ -4189,6 +4090,7 @@
             <a:spcAft>
               <a:spcPct val="35000"/>
             </a:spcAft>
+            <a:buNone/>
           </a:pPr>
           <a:r>
             <a:rPr lang="vi-VN" sz="2800" kern="1200">
@@ -4316,7 +4218,7 @@
         </a:bodyPr>
         <a:lstStyle/>
         <a:p>
-          <a:pPr lvl="0" algn="ctr" defTabSz="1244600">
+          <a:pPr marL="0" lvl="0" indent="0" algn="ctr" defTabSz="1244600">
             <a:lnSpc>
               <a:spcPct val="90000"/>
             </a:lnSpc>
@@ -4326,6 +4228,7 @@
             <a:spcAft>
               <a:spcPct val="35000"/>
             </a:spcAft>
+            <a:buNone/>
           </a:pPr>
           <a:r>
             <a:rPr lang="vi-VN" sz="2800" kern="1200">
@@ -4453,7 +4356,7 @@
         </a:bodyPr>
         <a:lstStyle/>
         <a:p>
-          <a:pPr lvl="0" algn="ctr" defTabSz="1244600">
+          <a:pPr marL="0" lvl="0" indent="0" algn="ctr" defTabSz="1244600">
             <a:lnSpc>
               <a:spcPct val="90000"/>
             </a:lnSpc>
@@ -4463,6 +4366,7 @@
             <a:spcAft>
               <a:spcPct val="35000"/>
             </a:spcAft>
+            <a:buNone/>
           </a:pPr>
           <a:r>
             <a:rPr lang="vi-VN" sz="2800" kern="1200" err="1">
@@ -4592,7 +4496,7 @@
         </a:bodyPr>
         <a:lstStyle/>
         <a:p>
-          <a:pPr lvl="0" algn="ctr" defTabSz="1244600">
+          <a:pPr marL="0" lvl="0" indent="0" algn="ctr" defTabSz="1244600">
             <a:lnSpc>
               <a:spcPct val="90000"/>
             </a:lnSpc>
@@ -4602,6 +4506,7 @@
             <a:spcAft>
               <a:spcPct val="35000"/>
             </a:spcAft>
+            <a:buNone/>
           </a:pPr>
           <a:r>
             <a:rPr lang="vi-VN" sz="2800" kern="1200">
@@ -4728,7 +4633,7 @@
         </a:bodyPr>
         <a:lstStyle/>
         <a:p>
-          <a:pPr lvl="0" algn="ctr" defTabSz="1244600">
+          <a:pPr marL="0" lvl="0" indent="0" algn="ctr" defTabSz="1244600">
             <a:lnSpc>
               <a:spcPct val="90000"/>
             </a:lnSpc>
@@ -4738,6 +4643,7 @@
             <a:spcAft>
               <a:spcPct val="35000"/>
             </a:spcAft>
+            <a:buNone/>
           </a:pPr>
           <a:r>
             <a:rPr lang="vi-VN" sz="2800" kern="1200">
@@ -4864,7 +4770,7 @@
         </a:bodyPr>
         <a:lstStyle/>
         <a:p>
-          <a:pPr lvl="0" algn="ctr" defTabSz="1244600">
+          <a:pPr marL="0" lvl="0" indent="0" algn="ctr" defTabSz="1244600">
             <a:lnSpc>
               <a:spcPct val="90000"/>
             </a:lnSpc>
@@ -4874,6 +4780,7 @@
             <a:spcAft>
               <a:spcPct val="35000"/>
             </a:spcAft>
+            <a:buNone/>
           </a:pPr>
           <a:r>
             <a:rPr lang="vi-VN" sz="2800" kern="1200">
@@ -7040,10 +6947,9 @@
           <a:p>
             <a:pPr algn="l"/>
             <a:r>
-              <a:rPr lang="en-US" smtClean="0"/>
+              <a:rPr lang="en-US"/>
               <a:t>Automative Team</a:t>
             </a:r>
-            <a:endParaRPr lang="en-US"/>
           </a:p>
         </p:txBody>
       </p:sp>
@@ -7150,13 +7056,6 @@
   <p:clrMapOvr>
     <a:masterClrMapping/>
   </p:clrMapOvr>
-  <p:timing>
-    <p:tnLst>
-      <p:par>
-        <p:cTn id="1" dur="indefinite" restart="never" nodeType="tmRoot"/>
-      </p:par>
-    </p:tnLst>
-  </p:timing>
 </p:sldLayout>
 </file>
 
@@ -7363,10 +7262,9 @@
           </a:lstStyle>
           <a:p>
             <a:r>
-              <a:rPr lang="en-US" smtClean="0"/>
+              <a:rPr lang="en-US"/>
               <a:t>Automative Team</a:t>
             </a:r>
-            <a:endParaRPr lang="en-US"/>
           </a:p>
         </p:txBody>
       </p:sp>
@@ -7464,13 +7362,6 @@
   <p:clrMapOvr>
     <a:masterClrMapping/>
   </p:clrMapOvr>
-  <p:timing>
-    <p:tnLst>
-      <p:par>
-        <p:cTn id="1" dur="indefinite" restart="never" nodeType="tmRoot"/>
-      </p:par>
-    </p:tnLst>
-  </p:timing>
 </p:sldLayout>
 </file>
 
@@ -11068,13 +10959,6 @@
   <p:clrMapOvr>
     <a:masterClrMapping/>
   </p:clrMapOvr>
-  <p:timing>
-    <p:tnLst>
-      <p:par>
-        <p:cTn id="1" dur="indefinite" restart="never" nodeType="tmRoot"/>
-      </p:par>
-    </p:tnLst>
-  </p:timing>
 </p:sldLayout>
 </file>
 
@@ -11163,10 +11047,9 @@
           <a:p>
             <a:pPr algn="l"/>
             <a:r>
-              <a:rPr lang="en-US" smtClean="0"/>
+              <a:rPr lang="en-US"/>
               <a:t>Automative Team</a:t>
             </a:r>
-            <a:endParaRPr lang="en-US"/>
           </a:p>
         </p:txBody>
       </p:sp>
@@ -11359,13 +11242,6 @@
   <p:clrMapOvr>
     <a:masterClrMapping/>
   </p:clrMapOvr>
-  <p:timing>
-    <p:tnLst>
-      <p:par>
-        <p:cTn id="1" dur="indefinite" restart="never" nodeType="tmRoot"/>
-      </p:par>
-    </p:tnLst>
-  </p:timing>
 </p:sldLayout>
 </file>
 
@@ -11495,10 +11371,9 @@
           <a:p>
             <a:pPr algn="l"/>
             <a:r>
-              <a:rPr lang="en-US" smtClean="0"/>
+              <a:rPr lang="en-US"/>
               <a:t>Automative Team</a:t>
             </a:r>
-            <a:endParaRPr lang="en-US"/>
           </a:p>
         </p:txBody>
       </p:sp>
@@ -11642,13 +11517,6 @@
     <p:sldLayoutId id="2147483664" r:id="rId3"/>
     <p:sldLayoutId id="2147483665" r:id="rId4"/>
   </p:sldLayoutIdLst>
-  <p:timing>
-    <p:tnLst>
-      <p:par>
-        <p:cTn id="1" dur="indefinite" restart="never" nodeType="tmRoot"/>
-      </p:par>
-    </p:tnLst>
-  </p:timing>
   <p:hf hdr="0" dt="0"/>
   <p:txStyles>
     <p:titleStyle>
@@ -15487,13 +15355,6 @@
   <p:clrMapOvr>
     <a:masterClrMapping/>
   </p:clrMapOvr>
-  <p:timing>
-    <p:tnLst>
-      <p:par>
-        <p:cTn id="1" dur="indefinite" restart="never" nodeType="tmRoot"/>
-      </p:par>
-    </p:tnLst>
-  </p:timing>
 </p:sld>
 </file>
 
@@ -15818,10 +15679,9 @@
           <a:lstStyle/>
           <a:p>
             <a:r>
-              <a:rPr lang="en-US" smtClean="0"/>
+              <a:rPr lang="en-US"/>
               <a:t>Automative Team</a:t>
             </a:r>
-            <a:endParaRPr lang="en-US"/>
           </a:p>
         </p:txBody>
       </p:sp>
@@ -15835,13 +15695,6 @@
   <p:clrMapOvr>
     <a:masterClrMapping/>
   </p:clrMapOvr>
-  <p:timing>
-    <p:tnLst>
-      <p:par>
-        <p:cTn id="1" dur="indefinite" restart="never" nodeType="tmRoot"/>
-      </p:par>
-    </p:tnLst>
-  </p:timing>
 </p:sld>
 </file>
 
@@ -16161,10 +16014,9 @@
           <a:lstStyle/>
           <a:p>
             <a:r>
-              <a:rPr lang="en-US" smtClean="0"/>
+              <a:rPr lang="en-US"/>
               <a:t>Automative Team</a:t>
             </a:r>
-            <a:endParaRPr lang="en-US"/>
           </a:p>
         </p:txBody>
       </p:sp>
@@ -16178,13 +16030,6 @@
   <p:clrMapOvr>
     <a:masterClrMapping/>
   </p:clrMapOvr>
-  <p:timing>
-    <p:tnLst>
-      <p:par>
-        <p:cTn id="1" dur="indefinite" restart="never" nodeType="tmRoot"/>
-      </p:par>
-    </p:tnLst>
-  </p:timing>
 </p:sld>
 </file>
 
@@ -16304,10 +16149,9 @@
           <a:p>
             <a:pPr algn="l"/>
             <a:r>
-              <a:rPr lang="en-US" smtClean="0"/>
+              <a:rPr lang="en-US"/>
               <a:t>Automative Team</a:t>
             </a:r>
-            <a:endParaRPr lang="en-US"/>
           </a:p>
         </p:txBody>
       </p:sp>
@@ -16321,13 +16165,6 @@
   <p:clrMapOvr>
     <a:masterClrMapping/>
   </p:clrMapOvr>
-  <p:timing>
-    <p:tnLst>
-      <p:par>
-        <p:cTn id="1" dur="indefinite" restart="never" nodeType="tmRoot"/>
-      </p:par>
-    </p:tnLst>
-  </p:timing>
 </p:sld>
 </file>
 
@@ -16550,10 +16387,9 @@
           <a:lstStyle/>
           <a:p>
             <a:r>
-              <a:rPr lang="en-US" smtClean="0"/>
+              <a:rPr lang="en-US"/>
               <a:t>Automative Team</a:t>
             </a:r>
-            <a:endParaRPr lang="en-US"/>
           </a:p>
         </p:txBody>
       </p:sp>
@@ -16567,13 +16403,6 @@
   <p:clrMapOvr>
     <a:masterClrMapping/>
   </p:clrMapOvr>
-  <p:timing>
-    <p:tnLst>
-      <p:par>
-        <p:cTn id="1" dur="indefinite" restart="never" nodeType="tmRoot"/>
-      </p:par>
-    </p:tnLst>
-  </p:timing>
 </p:sld>
 </file>
 
@@ -16693,10 +16522,9 @@
           <a:p>
             <a:pPr algn="l"/>
             <a:r>
-              <a:rPr lang="en-US" smtClean="0"/>
+              <a:rPr lang="en-US"/>
               <a:t>Automative Team</a:t>
             </a:r>
-            <a:endParaRPr lang="en-US"/>
           </a:p>
         </p:txBody>
       </p:sp>
@@ -16710,13 +16538,6 @@
   <p:clrMapOvr>
     <a:masterClrMapping/>
   </p:clrMapOvr>
-  <p:timing>
-    <p:tnLst>
-      <p:par>
-        <p:cTn id="1" dur="indefinite" restart="never" nodeType="tmRoot"/>
-      </p:par>
-    </p:tnLst>
-  </p:timing>
 </p:sld>
 </file>
 
@@ -17005,7 +16826,7 @@
           <a:p>
             <a:pPr algn="l"/>
             <a:r>
-              <a:rPr lang="en-US" sz="2600" smtClean="0">
+              <a:rPr lang="en-US" sz="2600">
                 <a:latin typeface="Arial"/>
                 <a:cs typeface="Arial"/>
               </a:rPr>
@@ -17051,7 +16872,7 @@
           <a:p>
             <a:pPr algn="l"/>
             <a:r>
-              <a:rPr lang="en-US" sz="2600" smtClean="0">
+              <a:rPr lang="en-US" sz="2600">
                 <a:latin typeface="Arial"/>
                 <a:cs typeface="Arial"/>
               </a:rPr>
@@ -17080,10 +16901,9 @@
           <a:lstStyle/>
           <a:p>
             <a:r>
-              <a:rPr lang="en-US" smtClean="0"/>
+              <a:rPr lang="en-US"/>
               <a:t>Automative Team</a:t>
             </a:r>
-            <a:endParaRPr lang="en-US"/>
           </a:p>
         </p:txBody>
       </p:sp>
@@ -17097,13 +16917,6 @@
   <p:clrMapOvr>
     <a:masterClrMapping/>
   </p:clrMapOvr>
-  <p:timing>
-    <p:tnLst>
-      <p:par>
-        <p:cTn id="1" dur="indefinite" restart="never" nodeType="tmRoot"/>
-      </p:par>
-    </p:tnLst>
-  </p:timing>
 </p:sld>
 </file>
 
@@ -17258,10 +17071,9 @@
           <a:lstStyle/>
           <a:p>
             <a:r>
-              <a:rPr lang="en-US" smtClean="0"/>
+              <a:rPr lang="en-US"/>
               <a:t>Automative Team</a:t>
             </a:r>
-            <a:endParaRPr lang="en-US"/>
           </a:p>
         </p:txBody>
       </p:sp>
@@ -17275,13 +17087,6 @@
   <p:clrMapOvr>
     <a:masterClrMapping/>
   </p:clrMapOvr>
-  <p:timing>
-    <p:tnLst>
-      <p:par>
-        <p:cTn id="1" dur="indefinite" restart="never" nodeType="tmRoot"/>
-      </p:par>
-    </p:tnLst>
-  </p:timing>
 </p:sld>
 </file>
 
@@ -17401,10 +17206,9 @@
           <a:p>
             <a:pPr algn="l"/>
             <a:r>
-              <a:rPr lang="en-US" smtClean="0"/>
+              <a:rPr lang="en-US"/>
               <a:t>Automative Team</a:t>
             </a:r>
-            <a:endParaRPr lang="en-US"/>
           </a:p>
         </p:txBody>
       </p:sp>
@@ -17418,13 +17222,6 @@
   <p:clrMapOvr>
     <a:masterClrMapping/>
   </p:clrMapOvr>
-  <p:timing>
-    <p:tnLst>
-      <p:par>
-        <p:cTn id="1" dur="indefinite" restart="never" nodeType="tmRoot"/>
-      </p:par>
-    </p:tnLst>
-  </p:timing>
 </p:sld>
 </file>
 
@@ -17515,7 +17312,7 @@
                 <a:latin typeface="Arial" panose="020B0604020202020204" pitchFamily="34" charset="0"/>
                 <a:cs typeface="Arial" panose="020B0604020202020204" pitchFamily="34" charset="0"/>
               </a:rPr>
-              <a:t>The client apps do not exit automatically when the server shuts down </a:t>
+              <a:t>The client apps can't handle special characters </a:t>
             </a:r>
           </a:p>
           <a:p>
@@ -17531,7 +17328,7 @@
                 <a:latin typeface="Arial" panose="020B0604020202020204" pitchFamily="34" charset="0"/>
                 <a:cs typeface="Arial" panose="020B0604020202020204" pitchFamily="34" charset="0"/>
               </a:rPr>
-              <a:t>The maximum number of clients has not been quantified yet</a:t>
+              <a:t>The maximum number of clients has not been quantified</a:t>
             </a:r>
           </a:p>
         </p:txBody>
@@ -17576,10 +17373,9 @@
           <a:lstStyle/>
           <a:p>
             <a:r>
-              <a:rPr lang="en-US" smtClean="0"/>
+              <a:rPr lang="en-US"/>
               <a:t>Automative Team</a:t>
             </a:r>
-            <a:endParaRPr lang="en-US"/>
           </a:p>
         </p:txBody>
       </p:sp>
@@ -17593,13 +17389,6 @@
   <p:clrMapOvr>
     <a:masterClrMapping/>
   </p:clrMapOvr>
-  <p:timing>
-    <p:tnLst>
-      <p:par>
-        <p:cTn id="1" dur="indefinite" restart="never" nodeType="tmRoot"/>
-      </p:par>
-    </p:tnLst>
-  </p:timing>
 </p:sld>
 </file>
 
@@ -17710,13 +17499,6 @@
   <p:clrMapOvr>
     <a:masterClrMapping/>
   </p:clrMapOvr>
-  <p:timing>
-    <p:tnLst>
-      <p:par>
-        <p:cTn id="1" dur="indefinite" restart="never" nodeType="tmRoot"/>
-      </p:par>
-    </p:tnLst>
-  </p:timing>
 </p:sld>
 </file>
 
@@ -17999,10 +17781,9 @@
           <a:p>
             <a:pPr algn="l"/>
             <a:r>
-              <a:rPr lang="en-US" smtClean="0"/>
+              <a:rPr lang="en-US"/>
               <a:t>Automative Team</a:t>
             </a:r>
-            <a:endParaRPr lang="en-US"/>
           </a:p>
         </p:txBody>
       </p:sp>
@@ -18016,13 +17797,6 @@
   <p:clrMapOvr>
     <a:masterClrMapping/>
   </p:clrMapOvr>
-  <p:timing>
-    <p:tnLst>
-      <p:par>
-        <p:cTn id="1" dur="indefinite" restart="never" nodeType="tmRoot"/>
-      </p:par>
-    </p:tnLst>
-  </p:timing>
 </p:sld>
 </file>
 
@@ -18236,10 +18010,9 @@
           <a:p>
             <a:pPr algn="l"/>
             <a:r>
-              <a:rPr lang="en-US" smtClean="0"/>
+              <a:rPr lang="en-US"/>
               <a:t>Automative Team</a:t>
             </a:r>
-            <a:endParaRPr lang="en-US"/>
           </a:p>
         </p:txBody>
       </p:sp>
@@ -18253,13 +18026,6 @@
   <p:clrMapOvr>
     <a:masterClrMapping/>
   </p:clrMapOvr>
-  <p:timing>
-    <p:tnLst>
-      <p:par>
-        <p:cTn id="1" dur="indefinite" restart="never" nodeType="tmRoot"/>
-      </p:par>
-    </p:tnLst>
-  </p:timing>
 </p:sld>
 </file>
 
@@ -18523,10 +18289,9 @@
           <a:lstStyle/>
           <a:p>
             <a:r>
-              <a:rPr lang="en-US" smtClean="0"/>
+              <a:rPr lang="en-US"/>
               <a:t>Automative Team</a:t>
             </a:r>
-            <a:endParaRPr lang="en-US"/>
           </a:p>
         </p:txBody>
       </p:sp>
@@ -18540,13 +18305,6 @@
   <p:clrMapOvr>
     <a:masterClrMapping/>
   </p:clrMapOvr>
-  <p:timing>
-    <p:tnLst>
-      <p:par>
-        <p:cTn id="1" dur="indefinite" restart="never" nodeType="tmRoot"/>
-      </p:par>
-    </p:tnLst>
-  </p:timing>
 </p:sld>
 </file>
 
@@ -19777,10 +19535,9 @@
           <a:lstStyle/>
           <a:p>
             <a:r>
-              <a:rPr lang="en-US" smtClean="0"/>
+              <a:rPr lang="en-US"/>
               <a:t>Automative Team</a:t>
             </a:r>
-            <a:endParaRPr lang="en-US"/>
           </a:p>
         </p:txBody>
       </p:sp>
@@ -19794,13 +19551,6 @@
   <p:clrMapOvr>
     <a:masterClrMapping/>
   </p:clrMapOvr>
-  <p:timing>
-    <p:tnLst>
-      <p:par>
-        <p:cTn id="1" dur="indefinite" restart="never" nodeType="tmRoot"/>
-      </p:par>
-    </p:tnLst>
-  </p:timing>
 </p:sld>
 </file>
 
@@ -20254,20 +20004,12 @@
                             </m:oMath>
                           </a14:m>
                           <a:r>
-                            <a:rPr lang="en-US" sz="2400" b="0" i="0" u="none" strike="noStrike" noProof="0" smtClean="0">
-                              <a:effectLst/>
-                              <a:latin typeface="Arial" panose="020B0604020202020204" pitchFamily="34" charset="0"/>
-                              <a:cs typeface="Arial" panose="020B0604020202020204" pitchFamily="34" charset="0"/>
-                            </a:rPr>
-                            <a:t> </a:t>
-                          </a:r>
-                          <a:r>
                             <a:rPr lang="en-US" sz="2400" b="0" i="0" u="none" strike="noStrike" noProof="0">
                               <a:effectLst/>
                               <a:latin typeface="Arial" panose="020B0604020202020204" pitchFamily="34" charset="0"/>
                               <a:cs typeface="Arial" panose="020B0604020202020204" pitchFamily="34" charset="0"/>
                             </a:rPr>
-                            <a:t>Can use multi-thread to accept multiple clients </a:t>
+                            <a:t> Can use multi-thread to accept multiple clients </a:t>
                           </a:r>
                           <a:endParaRPr lang="vi-VN" sz="2400" b="0" i="0" u="none" strike="noStrike" noProof="0">
                             <a:latin typeface="Arial" panose="020B0604020202020204" pitchFamily="34" charset="0"/>
@@ -20391,7 +20133,7 @@
                             <a:buNone/>
                           </a:pPr>
                           <a:r>
-                            <a:rPr lang="en-US" sz="2400" b="0" i="0" u="none" strike="noStrike" noProof="0" smtClean="0">
+                            <a:rPr lang="en-US" sz="2400" b="0" i="0" u="none" strike="noStrike" noProof="0">
                               <a:effectLst/>
                               <a:latin typeface="Arial" panose="020B0604020202020204" pitchFamily="34" charset="0"/>
                               <a:cs typeface="Arial" panose="020B0604020202020204" pitchFamily="34" charset="0"/>
@@ -20431,20 +20173,12 @@
                             </m:oMath>
                           </a14:m>
                           <a:r>
-                            <a:rPr lang="en-US" sz="2400" b="0" i="0" u="none" strike="noStrike" noProof="0" smtClean="0">
-                              <a:effectLst/>
-                              <a:latin typeface="Arial" panose="020B0604020202020204" pitchFamily="34" charset="0"/>
-                              <a:cs typeface="Arial" panose="020B0604020202020204" pitchFamily="34" charset="0"/>
-                            </a:rPr>
-                            <a:t>Not </a:t>
-                          </a:r>
-                          <a:r>
                             <a:rPr lang="en-US" sz="2400" b="0" i="0" u="none" strike="noStrike" noProof="0">
                               <a:effectLst/>
                               <a:latin typeface="Arial" panose="020B0604020202020204" pitchFamily="34" charset="0"/>
                               <a:cs typeface="Arial" panose="020B0604020202020204" pitchFamily="34" charset="0"/>
                             </a:rPr>
-                            <a:t>suitable for chat app software</a:t>
+                            <a:t>Not suitable for chat app software</a:t>
                           </a:r>
                           <a:endParaRPr lang="en-US" sz="2400">
                             <a:latin typeface="Arial" panose="020B0604020202020204" pitchFamily="34" charset="0"/>
@@ -20614,20 +20348,12 @@
                             </m:oMath>
                           </a14:m>
                           <a:r>
-                            <a:rPr lang="en-US" sz="2400" b="0" i="0" u="none" strike="noStrike" noProof="0" smtClean="0">
-                              <a:effectLst/>
-                              <a:latin typeface="Arial" panose="020B0604020202020204" pitchFamily="34" charset="0"/>
-                              <a:cs typeface="Arial" panose="020B0604020202020204" pitchFamily="34" charset="0"/>
-                            </a:rPr>
-                            <a:t> </a:t>
-                          </a:r>
-                          <a:r>
                             <a:rPr lang="en-US" sz="2400" b="0" i="0" u="none" strike="noStrike" noProof="0">
                               <a:effectLst/>
                               <a:latin typeface="Arial" panose="020B0604020202020204" pitchFamily="34" charset="0"/>
                               <a:cs typeface="Arial" panose="020B0604020202020204" pitchFamily="34" charset="0"/>
                             </a:rPr>
-                            <a:t>cannot communicate between multiple machines in 1 network</a:t>
+                            <a:t> cannot communicate between multiple machines in 1 network</a:t>
                           </a:r>
                           <a:endParaRPr lang="en-US" sz="2400">
                             <a:latin typeface="Arial" panose="020B0604020202020204" pitchFamily="34" charset="0"/>
@@ -21147,10 +20873,9 @@
           <a:lstStyle/>
           <a:p>
             <a:r>
-              <a:rPr lang="en-US" smtClean="0"/>
+              <a:rPr lang="en-US"/>
               <a:t>Automative Team</a:t>
             </a:r>
-            <a:endParaRPr lang="en-US"/>
           </a:p>
         </p:txBody>
       </p:sp>
@@ -21164,13 +20889,6 @@
   <p:clrMapOvr>
     <a:masterClrMapping/>
   </p:clrMapOvr>
-  <p:timing>
-    <p:tnLst>
-      <p:par>
-        <p:cTn id="1" dur="indefinite" restart="never" nodeType="tmRoot"/>
-      </p:par>
-    </p:tnLst>
-  </p:timing>
 </p:sld>
 </file>
 
@@ -21354,10 +21072,9 @@
           <a:lstStyle/>
           <a:p>
             <a:r>
-              <a:rPr lang="en-US" smtClean="0"/>
+              <a:rPr lang="en-US"/>
               <a:t>Automative Team</a:t>
             </a:r>
-            <a:endParaRPr lang="en-US"/>
           </a:p>
         </p:txBody>
       </p:sp>
@@ -21371,13 +21088,6 @@
   <p:clrMapOvr>
     <a:masterClrMapping/>
   </p:clrMapOvr>
-  <p:timing>
-    <p:tnLst>
-      <p:par>
-        <p:cTn id="1" dur="indefinite" restart="never" nodeType="tmRoot"/>
-      </p:par>
-    </p:tnLst>
-  </p:timing>
 </p:sld>
 </file>
 
@@ -21753,10 +21463,9 @@
           <a:lstStyle/>
           <a:p>
             <a:r>
-              <a:rPr lang="en-US" smtClean="0"/>
+              <a:rPr lang="en-US"/>
               <a:t>Automative Team</a:t>
             </a:r>
-            <a:endParaRPr lang="en-US"/>
           </a:p>
         </p:txBody>
       </p:sp>
@@ -22283,10 +21992,9 @@
           <a:lstStyle/>
           <a:p>
             <a:r>
-              <a:rPr lang="en-US" smtClean="0"/>
+              <a:rPr lang="en-US"/>
               <a:t>Automative Team</a:t>
             </a:r>
-            <a:endParaRPr lang="en-US"/>
           </a:p>
         </p:txBody>
       </p:sp>

</xml_diff>